<commit_message>
Reseting full system testing, deployments for continuous delivery
</commit_message>
<xml_diff>
--- a/FullSystemTesting/Full System Testing.pptx
+++ b/FullSystemTesting/Full System Testing.pptx
@@ -5,22 +5,19 @@
     <p:sldMasterId id="2147483684" r:id="rId1"/>
   </p:sldMasterIdLst>
   <p:notesMasterIdLst>
-    <p:notesMasterId r:id="rId15"/>
+    <p:notesMasterId r:id="rId12"/>
   </p:notesMasterIdLst>
   <p:sldIdLst>
-    <p:sldId id="256" r:id="rId2"/>
-    <p:sldId id="279" r:id="rId3"/>
-    <p:sldId id="280" r:id="rId4"/>
-    <p:sldId id="281" r:id="rId5"/>
-    <p:sldId id="257" r:id="rId6"/>
-    <p:sldId id="258" r:id="rId7"/>
-    <p:sldId id="260" r:id="rId8"/>
-    <p:sldId id="259" r:id="rId9"/>
-    <p:sldId id="261" r:id="rId10"/>
-    <p:sldId id="270" r:id="rId11"/>
-    <p:sldId id="274" r:id="rId12"/>
-    <p:sldId id="276" r:id="rId13"/>
-    <p:sldId id="278" r:id="rId14"/>
+    <p:sldId id="281" r:id="rId2"/>
+    <p:sldId id="257" r:id="rId3"/>
+    <p:sldId id="258" r:id="rId4"/>
+    <p:sldId id="260" r:id="rId5"/>
+    <p:sldId id="259" r:id="rId6"/>
+    <p:sldId id="261" r:id="rId7"/>
+    <p:sldId id="270" r:id="rId8"/>
+    <p:sldId id="274" r:id="rId9"/>
+    <p:sldId id="276" r:id="rId10"/>
+    <p:sldId id="278" r:id="rId11"/>
   </p:sldIdLst>
   <p:sldSz cx="9144000" cy="6858000" type="screen4x3"/>
   <p:notesSz cx="6858000" cy="9144000"/>
@@ -204,7 +201,7 @@
           <a:p>
             <a:fld id="{074B9B8A-C0D5-4739-B5A7-BC7C55255D4B}" type="datetimeFigureOut">
               <a:rPr lang="en-US" smtClean="0"/>
-              <a:t>10/16/2012</a:t>
+              <a:t>1/16/2013</a:t>
             </a:fld>
             <a:endParaRPr lang="en-US"/>
           </a:p>
@@ -609,7 +606,7 @@
           <a:p>
             <a:fld id="{9292B7C3-8478-4B80-9940-49D538A6BA12}" type="slidenum">
               <a:rPr lang="en-US" smtClean="0"/>
-              <a:t>5</a:t>
+              <a:t>2</a:t>
             </a:fld>
             <a:endParaRPr lang="en-US"/>
           </a:p>
@@ -697,7 +694,7 @@
           <a:p>
             <a:fld id="{9292B7C3-8478-4B80-9940-49D538A6BA12}" type="slidenum">
               <a:rPr lang="en-US" smtClean="0"/>
-              <a:t>6</a:t>
+              <a:t>3</a:t>
             </a:fld>
             <a:endParaRPr lang="en-US"/>
           </a:p>
@@ -794,7 +791,7 @@
           <a:p>
             <a:fld id="{9292B7C3-8478-4B80-9940-49D538A6BA12}" type="slidenum">
               <a:rPr lang="en-US" smtClean="0"/>
-              <a:t>7</a:t>
+              <a:t>4</a:t>
             </a:fld>
             <a:endParaRPr lang="en-US"/>
           </a:p>
@@ -882,7 +879,7 @@
           <a:p>
             <a:fld id="{9292B7C3-8478-4B80-9940-49D538A6BA12}" type="slidenum">
               <a:rPr lang="en-US" smtClean="0"/>
-              <a:t>8</a:t>
+              <a:t>5</a:t>
             </a:fld>
             <a:endParaRPr lang="en-US"/>
           </a:p>
@@ -1134,7 +1131,7 @@
           <a:p>
             <a:fld id="{9292B7C3-8478-4B80-9940-49D538A6BA12}" type="slidenum">
               <a:rPr lang="en-US" smtClean="0"/>
-              <a:t>9</a:t>
+              <a:t>6</a:t>
             </a:fld>
             <a:endParaRPr lang="en-US"/>
           </a:p>
@@ -1256,7 +1253,7 @@
           <a:p>
             <a:fld id="{9292B7C3-8478-4B80-9940-49D538A6BA12}" type="slidenum">
               <a:rPr lang="en-US" smtClean="0"/>
-              <a:t>10</a:t>
+              <a:t>7</a:t>
             </a:fld>
             <a:endParaRPr lang="en-US"/>
           </a:p>
@@ -1382,7 +1379,7 @@
           <a:p>
             <a:fld id="{9292B7C3-8478-4B80-9940-49D538A6BA12}" type="slidenum">
               <a:rPr lang="en-US" smtClean="0"/>
-              <a:t>11</a:t>
+              <a:t>8</a:t>
             </a:fld>
             <a:endParaRPr lang="en-US"/>
           </a:p>
@@ -1541,7 +1538,7 @@
           <a:p>
             <a:fld id="{9292B7C3-8478-4B80-9940-49D538A6BA12}" type="slidenum">
               <a:rPr lang="en-US" smtClean="0"/>
-              <a:t>12</a:t>
+              <a:t>9</a:t>
             </a:fld>
             <a:endParaRPr lang="en-US"/>
           </a:p>
@@ -1808,7 +1805,7 @@
           <a:p>
             <a:fld id="{9292B7C3-8478-4B80-9940-49D538A6BA12}" type="slidenum">
               <a:rPr lang="en-US" smtClean="0"/>
-              <a:t>13</a:t>
+              <a:t>10</a:t>
             </a:fld>
             <a:endParaRPr lang="en-US"/>
           </a:p>
@@ -2017,7 +2014,7 @@
           <a:p>
             <a:fld id="{7387D53C-C622-4EBB-841D-8D160E4759EF}" type="datetimeFigureOut">
               <a:rPr lang="en-US" smtClean="0"/>
-              <a:t>10/16/2012</a:t>
+              <a:t>1/16/2013</a:t>
             </a:fld>
             <a:endParaRPr lang="en-US"/>
           </a:p>
@@ -2202,7 +2199,7 @@
           <a:p>
             <a:fld id="{7387D53C-C622-4EBB-841D-8D160E4759EF}" type="datetimeFigureOut">
               <a:rPr lang="en-US" smtClean="0"/>
-              <a:t>10/16/2012</a:t>
+              <a:t>1/16/2013</a:t>
             </a:fld>
             <a:endParaRPr lang="en-US"/>
           </a:p>
@@ -2397,7 +2394,7 @@
           <a:p>
             <a:fld id="{7387D53C-C622-4EBB-841D-8D160E4759EF}" type="datetimeFigureOut">
               <a:rPr lang="en-US" smtClean="0"/>
-              <a:t>10/16/2012</a:t>
+              <a:t>1/16/2013</a:t>
             </a:fld>
             <a:endParaRPr lang="en-US"/>
           </a:p>
@@ -2582,7 +2579,7 @@
           <a:p>
             <a:fld id="{7387D53C-C622-4EBB-841D-8D160E4759EF}" type="datetimeFigureOut">
               <a:rPr lang="en-US" smtClean="0"/>
-              <a:t>10/16/2012</a:t>
+              <a:t>1/16/2013</a:t>
             </a:fld>
             <a:endParaRPr lang="en-US"/>
           </a:p>
@@ -2843,7 +2840,7 @@
           <a:p>
             <a:fld id="{7387D53C-C622-4EBB-841D-8D160E4759EF}" type="datetimeFigureOut">
               <a:rPr lang="en-US" smtClean="0"/>
-              <a:t>10/16/2012</a:t>
+              <a:t>1/16/2013</a:t>
             </a:fld>
             <a:endParaRPr lang="en-US"/>
           </a:p>
@@ -3149,7 +3146,7 @@
           <a:p>
             <a:fld id="{7387D53C-C622-4EBB-841D-8D160E4759EF}" type="datetimeFigureOut">
               <a:rPr lang="en-US" smtClean="0"/>
-              <a:t>10/16/2012</a:t>
+              <a:t>1/16/2013</a:t>
             </a:fld>
             <a:endParaRPr lang="en-US"/>
           </a:p>
@@ -3595,7 +3592,7 @@
           <a:p>
             <a:fld id="{7387D53C-C622-4EBB-841D-8D160E4759EF}" type="datetimeFigureOut">
               <a:rPr lang="en-US" smtClean="0"/>
-              <a:t>10/16/2012</a:t>
+              <a:t>1/16/2013</a:t>
             </a:fld>
             <a:endParaRPr lang="en-US"/>
           </a:p>
@@ -3725,7 +3722,7 @@
           <a:p>
             <a:fld id="{7387D53C-C622-4EBB-841D-8D160E4759EF}" type="datetimeFigureOut">
               <a:rPr lang="en-US" smtClean="0"/>
-              <a:t>10/16/2012</a:t>
+              <a:t>1/16/2013</a:t>
             </a:fld>
             <a:endParaRPr lang="en-US"/>
           </a:p>
@@ -3829,7 +3826,7 @@
           <a:p>
             <a:fld id="{7387D53C-C622-4EBB-841D-8D160E4759EF}" type="datetimeFigureOut">
               <a:rPr lang="en-US" smtClean="0"/>
-              <a:t>10/16/2012</a:t>
+              <a:t>1/16/2013</a:t>
             </a:fld>
             <a:endParaRPr lang="en-US"/>
           </a:p>
@@ -4124,7 +4121,7 @@
           <a:p>
             <a:fld id="{7387D53C-C622-4EBB-841D-8D160E4759EF}" type="datetimeFigureOut">
               <a:rPr lang="en-US" smtClean="0"/>
-              <a:t>10/16/2012</a:t>
+              <a:t>1/16/2013</a:t>
             </a:fld>
             <a:endParaRPr lang="en-US"/>
           </a:p>
@@ -4395,7 +4392,7 @@
           <a:p>
             <a:fld id="{7387D53C-C622-4EBB-841D-8D160E4759EF}" type="datetimeFigureOut">
               <a:rPr lang="en-US" smtClean="0"/>
-              <a:t>10/16/2012</a:t>
+              <a:t>1/16/2013</a:t>
             </a:fld>
             <a:endParaRPr lang="en-US"/>
           </a:p>
@@ -4623,7 +4620,7 @@
           <a:p>
             <a:fld id="{7387D53C-C622-4EBB-841D-8D160E4759EF}" type="datetimeFigureOut">
               <a:rPr lang="en-US" smtClean="0"/>
-              <a:t>10/16/2012</a:t>
+              <a:t>1/16/2013</a:t>
             </a:fld>
             <a:endParaRPr lang="en-US"/>
           </a:p>
@@ -5123,1293 +5120,6 @@
               </a:rPr>
               <a:t>jimmybogard.lostechies.com</a:t>
             </a:r>
-            <a:r>
-              <a:rPr lang="en-US" sz="3600" b="1" dirty="0" smtClean="0">
-                <a:latin typeface="Verdana" pitchFamily="34" charset="0"/>
-                <a:ea typeface="Verdana" pitchFamily="34" charset="0"/>
-                <a:cs typeface="Verdana" pitchFamily="34" charset="0"/>
-              </a:rPr>
-              <a:t/>
-            </a:r>
-            <a:br>
-              <a:rPr lang="en-US" sz="3600" b="1" dirty="0" smtClean="0">
-                <a:latin typeface="Verdana" pitchFamily="34" charset="0"/>
-                <a:ea typeface="Verdana" pitchFamily="34" charset="0"/>
-                <a:cs typeface="Verdana" pitchFamily="34" charset="0"/>
-              </a:rPr>
-            </a:br>
-            <a:r>
-              <a:rPr lang="en-US" sz="3600" b="1" dirty="0" smtClean="0">
-                <a:latin typeface="Verdana" pitchFamily="34" charset="0"/>
-                <a:ea typeface="Verdana" pitchFamily="34" charset="0"/>
-                <a:cs typeface="Verdana" pitchFamily="34" charset="0"/>
-              </a:rPr>
-              <a:t>Headspring</a:t>
-            </a:r>
-            <a:endParaRPr lang="en-US" sz="3600" dirty="0">
-              <a:latin typeface="Verdana" pitchFamily="34" charset="0"/>
-              <a:ea typeface="Verdana" pitchFamily="34" charset="0"/>
-              <a:cs typeface="Verdana" pitchFamily="34" charset="0"/>
-            </a:endParaRPr>
-          </a:p>
-        </p:txBody>
-      </p:sp>
-      <p:pic>
-        <p:nvPicPr>
-          <p:cNvPr id="1026" name="Picture 2" descr="http://www.manning.com/palermo3/palermo3_cover150.jpg"/>
-          <p:cNvPicPr>
-            <a:picLocks noChangeAspect="1" noChangeArrowheads="1"/>
-          </p:cNvPicPr>
-          <p:nvPr/>
-        </p:nvPicPr>
-        <p:blipFill>
-          <a:blip r:embed="rId4">
-            <a:extLst>
-              <a:ext uri="{28A0092B-C50C-407E-A947-70E740481C1C}">
-                <a14:useLocalDpi xmlns:a14="http://schemas.microsoft.com/office/drawing/2010/main" val="0"/>
-              </a:ext>
-            </a:extLst>
-          </a:blip>
-          <a:srcRect/>
-          <a:stretch>
-            <a:fillRect/>
-          </a:stretch>
-        </p:blipFill>
-        <p:spPr bwMode="auto">
-          <a:xfrm>
-            <a:off x="381000" y="3733800"/>
-            <a:ext cx="1428750" cy="1790701"/>
-          </a:xfrm>
-          <a:prstGeom prst="rect">
-            <a:avLst/>
-          </a:prstGeom>
-          <a:noFill/>
-          <a:extLst>
-            <a:ext uri="{909E8E84-426E-40DD-AFC4-6F175D3DCCD1}">
-              <a14:hiddenFill xmlns:a14="http://schemas.microsoft.com/office/drawing/2010/main">
-                <a:solidFill>
-                  <a:srgbClr val="FFFFFF"/>
-                </a:solidFill>
-              </a14:hiddenFill>
-            </a:ext>
-          </a:extLst>
-        </p:spPr>
-      </p:pic>
-      <p:pic>
-        <p:nvPicPr>
-          <p:cNvPr id="1028" name="Picture 4" descr="https://mvp.support.microsoft.com/library/images/support/en-US/MVPLogo.gif"/>
-          <p:cNvPicPr>
-            <a:picLocks noChangeAspect="1" noChangeArrowheads="1"/>
-          </p:cNvPicPr>
-          <p:nvPr/>
-        </p:nvPicPr>
-        <p:blipFill>
-          <a:blip r:embed="rId5">
-            <a:extLst>
-              <a:ext uri="{28A0092B-C50C-407E-A947-70E740481C1C}">
-                <a14:useLocalDpi xmlns:a14="http://schemas.microsoft.com/office/drawing/2010/main" val="0"/>
-              </a:ext>
-            </a:extLst>
-          </a:blip>
-          <a:srcRect/>
-          <a:stretch>
-            <a:fillRect/>
-          </a:stretch>
-        </p:blipFill>
-        <p:spPr bwMode="auto">
-          <a:xfrm>
-            <a:off x="7315200" y="3733800"/>
-            <a:ext cx="1095375" cy="1714500"/>
-          </a:xfrm>
-          <a:prstGeom prst="rect">
-            <a:avLst/>
-          </a:prstGeom>
-          <a:noFill/>
-          <a:extLst>
-            <a:ext uri="{909E8E84-426E-40DD-AFC4-6F175D3DCCD1}">
-              <a14:hiddenFill xmlns:a14="http://schemas.microsoft.com/office/drawing/2010/main">
-                <a:solidFill>
-                  <a:srgbClr val="FFFFFF"/>
-                </a:solidFill>
-              </a14:hiddenFill>
-            </a:ext>
-          </a:extLst>
-        </p:spPr>
-      </p:pic>
-      <p:pic>
-        <p:nvPicPr>
-          <p:cNvPr id="1030" name="Picture 6" descr="http://www.headspring.com/images/logo.png"/>
-          <p:cNvPicPr>
-            <a:picLocks noChangeAspect="1" noChangeArrowheads="1"/>
-          </p:cNvPicPr>
-          <p:nvPr/>
-        </p:nvPicPr>
-        <p:blipFill>
-          <a:blip r:embed="rId6">
-            <a:extLst>
-              <a:ext uri="{28A0092B-C50C-407E-A947-70E740481C1C}">
-                <a14:useLocalDpi xmlns:a14="http://schemas.microsoft.com/office/drawing/2010/main" val="0"/>
-              </a:ext>
-            </a:extLst>
-          </a:blip>
-          <a:srcRect/>
-          <a:stretch>
-            <a:fillRect/>
-          </a:stretch>
-        </p:blipFill>
-        <p:spPr bwMode="auto">
-          <a:xfrm>
-            <a:off x="2476500" y="3733800"/>
-            <a:ext cx="3619500" cy="723900"/>
-          </a:xfrm>
-          <a:prstGeom prst="rect">
-            <a:avLst/>
-          </a:prstGeom>
-          <a:noFill/>
-          <a:extLst>
-            <a:ext uri="{909E8E84-426E-40DD-AFC4-6F175D3DCCD1}">
-              <a14:hiddenFill xmlns:a14="http://schemas.microsoft.com/office/drawing/2010/main">
-                <a:solidFill>
-                  <a:srgbClr val="FFFFFF"/>
-                </a:solidFill>
-              </a14:hiddenFill>
-            </a:ext>
-          </a:extLst>
-        </p:spPr>
-      </p:pic>
-      <p:pic>
-        <p:nvPicPr>
-          <p:cNvPr id="1032" name="Picture 8" descr="http://lostechies.com/wp-content/themes/lostechies/images/lostechies_logo.png"/>
-          <p:cNvPicPr>
-            <a:picLocks noChangeAspect="1" noChangeArrowheads="1"/>
-          </p:cNvPicPr>
-          <p:nvPr/>
-        </p:nvPicPr>
-        <p:blipFill>
-          <a:blip r:embed="rId7">
-            <a:extLst>
-              <a:ext uri="{28A0092B-C50C-407E-A947-70E740481C1C}">
-                <a14:useLocalDpi xmlns:a14="http://schemas.microsoft.com/office/drawing/2010/main" val="0"/>
-              </a:ext>
-            </a:extLst>
-          </a:blip>
-          <a:srcRect/>
-          <a:stretch>
-            <a:fillRect/>
-          </a:stretch>
-        </p:blipFill>
-        <p:spPr bwMode="auto">
-          <a:xfrm>
-            <a:off x="1389645" y="4724400"/>
-            <a:ext cx="6047539" cy="733425"/>
-          </a:xfrm>
-          <a:prstGeom prst="rect">
-            <a:avLst/>
-          </a:prstGeom>
-          <a:noFill/>
-          <a:extLst>
-            <a:ext uri="{909E8E84-426E-40DD-AFC4-6F175D3DCCD1}">
-              <a14:hiddenFill xmlns:a14="http://schemas.microsoft.com/office/drawing/2010/main">
-                <a:solidFill>
-                  <a:srgbClr val="FFFFFF"/>
-                </a:solidFill>
-              </a14:hiddenFill>
-            </a:ext>
-          </a:extLst>
-        </p:spPr>
-      </p:pic>
-      <p:pic>
-        <p:nvPicPr>
-          <p:cNvPr id="1036" name="Picture 12" descr="AutoMapper"/>
-          <p:cNvPicPr>
-            <a:picLocks noChangeAspect="1" noChangeArrowheads="1"/>
-          </p:cNvPicPr>
-          <p:nvPr/>
-        </p:nvPicPr>
-        <p:blipFill>
-          <a:blip r:embed="rId8">
-            <a:extLst>
-              <a:ext uri="{28A0092B-C50C-407E-A947-70E740481C1C}">
-                <a14:useLocalDpi xmlns:a14="http://schemas.microsoft.com/office/drawing/2010/main" val="0"/>
-              </a:ext>
-            </a:extLst>
-          </a:blip>
-          <a:srcRect/>
-          <a:stretch>
-            <a:fillRect/>
-          </a:stretch>
-        </p:blipFill>
-        <p:spPr bwMode="auto">
-          <a:xfrm>
-            <a:off x="2476500" y="5871325"/>
-            <a:ext cx="3733800" cy="382377"/>
-          </a:xfrm>
-          <a:prstGeom prst="rect">
-            <a:avLst/>
-          </a:prstGeom>
-          <a:noFill/>
-          <a:extLst>
-            <a:ext uri="{909E8E84-426E-40DD-AFC4-6F175D3DCCD1}">
-              <a14:hiddenFill xmlns:a14="http://schemas.microsoft.com/office/drawing/2010/main">
-                <a:solidFill>
-                  <a:srgbClr val="FFFFFF"/>
-                </a:solidFill>
-              </a14:hiddenFill>
-            </a:ext>
-          </a:extLst>
-        </p:spPr>
-      </p:pic>
-    </p:spTree>
-    <p:custDataLst>
-      <p:tags r:id="rId1"/>
-    </p:custDataLst>
-  </p:cSld>
-  <p:clrMapOvr>
-    <a:masterClrMapping/>
-  </p:clrMapOvr>
-  <p:timing>
-    <p:tnLst>
-      <p:par>
-        <p:cTn id="1" dur="indefinite" restart="never" nodeType="tmRoot"/>
-      </p:par>
-    </p:tnLst>
-  </p:timing>
-</p:sld>
-</file>
-
-<file path=ppt/slides/slide10.xml><?xml version="1.0" encoding="utf-8"?>
-<p:sld xmlns:a="http://schemas.openxmlformats.org/drawingml/2006/main" xmlns:r="http://schemas.openxmlformats.org/officeDocument/2006/relationships" xmlns:p="http://schemas.openxmlformats.org/presentationml/2006/main">
-  <p:cSld>
-    <p:spTree>
-      <p:nvGrpSpPr>
-        <p:cNvPr id="1" name=""/>
-        <p:cNvGrpSpPr/>
-        <p:nvPr/>
-      </p:nvGrpSpPr>
-      <p:grpSpPr>
-        <a:xfrm>
-          <a:off x="0" y="0"/>
-          <a:ext cx="0" cy="0"/>
-          <a:chOff x="0" y="0"/>
-          <a:chExt cx="0" cy="0"/>
-        </a:xfrm>
-      </p:grpSpPr>
-      <p:pic>
-        <p:nvPicPr>
-          <p:cNvPr id="1026" name="Picture 2" descr="Selenium Logo"/>
-          <p:cNvPicPr>
-            <a:picLocks noChangeAspect="1" noChangeArrowheads="1"/>
-          </p:cNvPicPr>
-          <p:nvPr>
-            <p:custDataLst>
-              <p:tags r:id="rId2"/>
-            </p:custDataLst>
-          </p:nvPr>
-        </p:nvPicPr>
-        <p:blipFill>
-          <a:blip r:embed="rId8">
-            <a:extLst>
-              <a:ext uri="{28A0092B-C50C-407E-A947-70E740481C1C}">
-                <a14:useLocalDpi xmlns:a14="http://schemas.microsoft.com/office/drawing/2010/main" val="0"/>
-              </a:ext>
-            </a:extLst>
-          </a:blip>
-          <a:srcRect/>
-          <a:stretch>
-            <a:fillRect/>
-          </a:stretch>
-        </p:blipFill>
-        <p:spPr bwMode="auto">
-          <a:xfrm>
-            <a:off x="1905000" y="609599"/>
-            <a:ext cx="1905000" cy="1724025"/>
-          </a:xfrm>
-          <a:prstGeom prst="rect">
-            <a:avLst/>
-          </a:prstGeom>
-          <a:noFill/>
-          <a:extLst>
-            <a:ext uri="{909E8E84-426E-40DD-AFC4-6F175D3DCCD1}">
-              <a14:hiddenFill xmlns:a14="http://schemas.microsoft.com/office/drawing/2010/main">
-                <a:solidFill>
-                  <a:srgbClr val="FFFFFF"/>
-                </a:solidFill>
-              </a14:hiddenFill>
-            </a:ext>
-          </a:extLst>
-        </p:spPr>
-      </p:pic>
-      <p:pic>
-        <p:nvPicPr>
-          <p:cNvPr id="1028" name="Picture 4" descr="Icon for package NUnit"/>
-          <p:cNvPicPr>
-            <a:picLocks noChangeAspect="1" noChangeArrowheads="1"/>
-          </p:cNvPicPr>
-          <p:nvPr>
-            <p:custDataLst>
-              <p:tags r:id="rId3"/>
-            </p:custDataLst>
-          </p:nvPr>
-        </p:nvPicPr>
-        <p:blipFill>
-          <a:blip r:embed="rId9">
-            <a:extLst>
-              <a:ext uri="{28A0092B-C50C-407E-A947-70E740481C1C}">
-                <a14:useLocalDpi xmlns:a14="http://schemas.microsoft.com/office/drawing/2010/main" val="0"/>
-              </a:ext>
-            </a:extLst>
-          </a:blip>
-          <a:srcRect/>
-          <a:stretch>
-            <a:fillRect/>
-          </a:stretch>
-        </p:blipFill>
-        <p:spPr bwMode="auto">
-          <a:xfrm>
-            <a:off x="5791200" y="1509712"/>
-            <a:ext cx="1981200" cy="1981207"/>
-          </a:xfrm>
-          <a:prstGeom prst="rect">
-            <a:avLst/>
-          </a:prstGeom>
-          <a:noFill/>
-          <a:extLst>
-            <a:ext uri="{909E8E84-426E-40DD-AFC4-6F175D3DCCD1}">
-              <a14:hiddenFill xmlns:a14="http://schemas.microsoft.com/office/drawing/2010/main">
-                <a:solidFill>
-                  <a:srgbClr val="FFFFFF"/>
-                </a:solidFill>
-              </a14:hiddenFill>
-            </a:ext>
-          </a:extLst>
-        </p:spPr>
-      </p:pic>
-      <p:pic>
-        <p:nvPicPr>
-          <p:cNvPr id="8" name="Picture 2"/>
-          <p:cNvPicPr>
-            <a:picLocks noChangeAspect="1" noChangeArrowheads="1"/>
-          </p:cNvPicPr>
-          <p:nvPr>
-            <p:custDataLst>
-              <p:tags r:id="rId4"/>
-            </p:custDataLst>
-          </p:nvPr>
-        </p:nvPicPr>
-        <p:blipFill>
-          <a:blip r:embed="rId10" cstate="print"/>
-          <a:srcRect/>
-          <a:stretch>
-            <a:fillRect/>
-          </a:stretch>
-        </p:blipFill>
-        <p:spPr bwMode="auto">
-          <a:xfrm>
-            <a:off x="4048125" y="4648200"/>
-            <a:ext cx="4095750" cy="1534045"/>
-          </a:xfrm>
-          <a:prstGeom prst="rect">
-            <a:avLst/>
-          </a:prstGeom>
-          <a:noFill/>
-          <a:ln w="9525">
-            <a:noFill/>
-            <a:miter lim="800000"/>
-            <a:headEnd/>
-            <a:tailEnd/>
-          </a:ln>
-          <a:effectLst/>
-        </p:spPr>
-      </p:pic>
-      <p:pic>
-        <p:nvPicPr>
-          <p:cNvPr id="1029" name="Picture 5"/>
-          <p:cNvPicPr>
-            <a:picLocks noChangeAspect="1" noChangeArrowheads="1"/>
-          </p:cNvPicPr>
-          <p:nvPr>
-            <p:custDataLst>
-              <p:tags r:id="rId5"/>
-            </p:custDataLst>
-          </p:nvPr>
-        </p:nvPicPr>
-        <p:blipFill>
-          <a:blip r:embed="rId11">
-            <a:extLst>
-              <a:ext uri="{28A0092B-C50C-407E-A947-70E740481C1C}">
-                <a14:useLocalDpi xmlns:a14="http://schemas.microsoft.com/office/drawing/2010/main" val="0"/>
-              </a:ext>
-            </a:extLst>
-          </a:blip>
-          <a:srcRect/>
-          <a:stretch>
-            <a:fillRect/>
-          </a:stretch>
-        </p:blipFill>
-        <p:spPr bwMode="auto">
-          <a:xfrm>
-            <a:off x="1303401" y="3038474"/>
-            <a:ext cx="3497199" cy="1304925"/>
-          </a:xfrm>
-          <a:prstGeom prst="rect">
-            <a:avLst/>
-          </a:prstGeom>
-          <a:noFill/>
-          <a:ln>
-            <a:noFill/>
-          </a:ln>
-          <a:effectLst/>
-          <a:extLst>
-            <a:ext uri="{909E8E84-426E-40DD-AFC4-6F175D3DCCD1}">
-              <a14:hiddenFill xmlns:a14="http://schemas.microsoft.com/office/drawing/2010/main">
-                <a:solidFill>
-                  <a:schemeClr val="accent1"/>
-                </a:solidFill>
-              </a14:hiddenFill>
-            </a:ext>
-            <a:ext uri="{91240B29-F687-4F45-9708-019B960494DF}">
-              <a14:hiddenLine xmlns:a14="http://schemas.microsoft.com/office/drawing/2010/main" w="9525">
-                <a:solidFill>
-                  <a:schemeClr val="tx1"/>
-                </a:solidFill>
-                <a:miter lim="800000"/>
-                <a:headEnd/>
-                <a:tailEnd/>
-              </a14:hiddenLine>
-            </a:ext>
-            <a:ext uri="{AF507438-7753-43E0-B8FC-AC1667EBCBE1}">
-              <a14:hiddenEffects xmlns:a14="http://schemas.microsoft.com/office/drawing/2010/main">
-                <a:effectLst>
-                  <a:outerShdw dist="35921" dir="2700000" algn="ctr" rotWithShape="0">
-                    <a:schemeClr val="bg2"/>
-                  </a:outerShdw>
-                </a:effectLst>
-              </a14:hiddenEffects>
-            </a:ext>
-          </a:extLst>
-        </p:spPr>
-      </p:pic>
-    </p:spTree>
-    <p:custDataLst>
-      <p:tags r:id="rId1"/>
-    </p:custDataLst>
-  </p:cSld>
-  <p:clrMapOvr>
-    <a:masterClrMapping/>
-  </p:clrMapOvr>
-  <p:timing>
-    <p:tnLst>
-      <p:par>
-        <p:cTn id="1" dur="indefinite" restart="never" nodeType="tmRoot"/>
-      </p:par>
-    </p:tnLst>
-  </p:timing>
-</p:sld>
-</file>
-
-<file path=ppt/slides/slide11.xml><?xml version="1.0" encoding="utf-8"?>
-<p:sld xmlns:a="http://schemas.openxmlformats.org/drawingml/2006/main" xmlns:r="http://schemas.openxmlformats.org/officeDocument/2006/relationships" xmlns:p="http://schemas.openxmlformats.org/presentationml/2006/main">
-  <p:cSld>
-    <p:spTree>
-      <p:nvGrpSpPr>
-        <p:cNvPr id="1" name=""/>
-        <p:cNvGrpSpPr/>
-        <p:nvPr/>
-      </p:nvGrpSpPr>
-      <p:grpSpPr>
-        <a:xfrm>
-          <a:off x="0" y="0"/>
-          <a:ext cx="0" cy="0"/>
-          <a:chOff x="0" y="0"/>
-          <a:chExt cx="0" cy="0"/>
-        </a:xfrm>
-      </p:grpSpPr>
-      <p:pic>
-        <p:nvPicPr>
-          <p:cNvPr id="4100" name="Picture 4"/>
-          <p:cNvPicPr>
-            <a:picLocks noChangeAspect="1" noChangeArrowheads="1"/>
-          </p:cNvPicPr>
-          <p:nvPr>
-            <p:custDataLst>
-              <p:tags r:id="rId2"/>
-            </p:custDataLst>
-          </p:nvPr>
-        </p:nvPicPr>
-        <p:blipFill>
-          <a:blip r:embed="rId5">
-            <a:extLst>
-              <a:ext uri="{28A0092B-C50C-407E-A947-70E740481C1C}">
-                <a14:useLocalDpi xmlns:a14="http://schemas.microsoft.com/office/drawing/2010/main" val="0"/>
-              </a:ext>
-            </a:extLst>
-          </a:blip>
-          <a:srcRect/>
-          <a:stretch>
-            <a:fillRect/>
-          </a:stretch>
-        </p:blipFill>
-        <p:spPr bwMode="auto">
-          <a:xfrm>
-            <a:off x="228600" y="152400"/>
-            <a:ext cx="8702181" cy="6324600"/>
-          </a:xfrm>
-          <a:prstGeom prst="rect">
-            <a:avLst/>
-          </a:prstGeom>
-          <a:noFill/>
-          <a:ln>
-            <a:noFill/>
-          </a:ln>
-          <a:effectLst>
-            <a:glow rad="63500">
-              <a:schemeClr val="accent4">
-                <a:satMod val="175000"/>
-                <a:alpha val="40000"/>
-              </a:schemeClr>
-            </a:glow>
-            <a:outerShdw dist="35921" dir="2700000" algn="ctr" rotWithShape="0">
-              <a:schemeClr val="bg2"/>
-            </a:outerShdw>
-          </a:effectLst>
-          <a:extLst>
-            <a:ext uri="{909E8E84-426E-40DD-AFC4-6F175D3DCCD1}">
-              <a14:hiddenFill xmlns:a14="http://schemas.microsoft.com/office/drawing/2010/main">
-                <a:solidFill>
-                  <a:schemeClr val="accent1"/>
-                </a:solidFill>
-              </a14:hiddenFill>
-            </a:ext>
-            <a:ext uri="{91240B29-F687-4F45-9708-019B960494DF}">
-              <a14:hiddenLine xmlns:a14="http://schemas.microsoft.com/office/drawing/2010/main" w="9525">
-                <a:solidFill>
-                  <a:schemeClr val="tx1"/>
-                </a:solidFill>
-                <a:miter lim="800000"/>
-                <a:headEnd/>
-                <a:tailEnd/>
-              </a14:hiddenLine>
-            </a:ext>
-          </a:extLst>
-        </p:spPr>
-      </p:pic>
-    </p:spTree>
-    <p:custDataLst>
-      <p:tags r:id="rId1"/>
-    </p:custDataLst>
-  </p:cSld>
-  <p:clrMapOvr>
-    <a:masterClrMapping/>
-  </p:clrMapOvr>
-  <p:timing>
-    <p:tnLst>
-      <p:par>
-        <p:cTn id="1" dur="indefinite" restart="never" nodeType="tmRoot"/>
-      </p:par>
-    </p:tnLst>
-  </p:timing>
-</p:sld>
-</file>
-
-<file path=ppt/slides/slide12.xml><?xml version="1.0" encoding="utf-8"?>
-<p:sld xmlns:a="http://schemas.openxmlformats.org/drawingml/2006/main" xmlns:r="http://schemas.openxmlformats.org/officeDocument/2006/relationships" xmlns:p="http://schemas.openxmlformats.org/presentationml/2006/main">
-  <p:cSld>
-    <p:spTree>
-      <p:nvGrpSpPr>
-        <p:cNvPr id="1" name=""/>
-        <p:cNvGrpSpPr/>
-        <p:nvPr/>
-      </p:nvGrpSpPr>
-      <p:grpSpPr>
-        <a:xfrm>
-          <a:off x="0" y="0"/>
-          <a:ext cx="0" cy="0"/>
-          <a:chOff x="0" y="0"/>
-          <a:chExt cx="0" cy="0"/>
-        </a:xfrm>
-      </p:grpSpPr>
-      <p:sp>
-        <p:nvSpPr>
-          <p:cNvPr id="3" name="Content Placeholder 2"/>
-          <p:cNvSpPr>
-            <a:spLocks noGrp="1"/>
-          </p:cNvSpPr>
-          <p:nvPr>
-            <p:ph idx="1"/>
-            <p:custDataLst>
-              <p:tags r:id="rId2"/>
-            </p:custDataLst>
-          </p:nvPr>
-        </p:nvSpPr>
-        <p:spPr>
-          <a:xfrm>
-            <a:off x="228600" y="301748"/>
-            <a:ext cx="4038600" cy="6099051"/>
-          </a:xfrm>
-        </p:spPr>
-        <p:txBody>
-          <a:bodyPr>
-            <a:noAutofit/>
-          </a:bodyPr>
-          <a:lstStyle/>
-          <a:p>
-            <a:pPr>
-              <a:buFont typeface="+mj-lt"/>
-              <a:buAutoNum type="arabicPeriod"/>
-            </a:pPr>
-            <a:r>
-              <a:rPr lang="en-US" sz="2400" dirty="0" smtClean="0"/>
-              <a:t>Conferences link text could change</a:t>
-            </a:r>
-          </a:p>
-          <a:p>
-            <a:pPr>
-              <a:buFont typeface="+mj-lt"/>
-              <a:buAutoNum type="arabicPeriod"/>
-            </a:pPr>
-            <a:r>
-              <a:rPr lang="en-US" sz="2400" dirty="0" smtClean="0"/>
-              <a:t>Edit link text could change</a:t>
-            </a:r>
-          </a:p>
-          <a:p>
-            <a:pPr>
-              <a:buFont typeface="+mj-lt"/>
-              <a:buAutoNum type="arabicPeriod"/>
-            </a:pPr>
-            <a:r>
-              <a:rPr lang="en-US" sz="2400" dirty="0" smtClean="0"/>
-              <a:t>Could pick wrong conference to edit</a:t>
-            </a:r>
-          </a:p>
-          <a:p>
-            <a:pPr>
-              <a:buFont typeface="+mj-lt"/>
-              <a:buAutoNum type="arabicPeriod"/>
-            </a:pPr>
-            <a:r>
-              <a:rPr lang="en-US" sz="2400" dirty="0" smtClean="0"/>
-              <a:t>Input element name could change</a:t>
-            </a:r>
-          </a:p>
-          <a:p>
-            <a:pPr>
-              <a:buFont typeface="+mj-lt"/>
-              <a:buAutoNum type="arabicPeriod"/>
-            </a:pPr>
-            <a:r>
-              <a:rPr lang="en-US" sz="2400" dirty="0" smtClean="0"/>
-              <a:t>Save button text could change</a:t>
-            </a:r>
-          </a:p>
-          <a:p>
-            <a:pPr>
-              <a:buFont typeface="+mj-lt"/>
-              <a:buAutoNum type="arabicPeriod"/>
-            </a:pPr>
-            <a:r>
-              <a:rPr lang="en-US" sz="2400" dirty="0" smtClean="0"/>
-              <a:t>Could have more than one form on page</a:t>
-            </a:r>
-          </a:p>
-          <a:p>
-            <a:pPr>
-              <a:buFont typeface="+mj-lt"/>
-              <a:buAutoNum type="arabicPeriod"/>
-            </a:pPr>
-            <a:r>
-              <a:rPr lang="en-US" sz="2400" dirty="0" smtClean="0"/>
-              <a:t>Landing </a:t>
-            </a:r>
-            <a:r>
-              <a:rPr lang="en-US" sz="2400" dirty="0" err="1" smtClean="0"/>
-              <a:t>url</a:t>
-            </a:r>
-            <a:r>
-              <a:rPr lang="en-US" sz="2400" dirty="0" smtClean="0"/>
-              <a:t> could change</a:t>
-            </a:r>
-          </a:p>
-          <a:p>
-            <a:pPr>
-              <a:buFont typeface="+mj-lt"/>
-              <a:buAutoNum type="arabicPeriod"/>
-            </a:pPr>
-            <a:r>
-              <a:rPr lang="en-US" sz="2400" dirty="0" smtClean="0"/>
-              <a:t>Conference name text could be anywhere</a:t>
-            </a:r>
-            <a:endParaRPr lang="en-US" sz="2400" dirty="0"/>
-          </a:p>
-        </p:txBody>
-      </p:sp>
-      <p:pic>
-        <p:nvPicPr>
-          <p:cNvPr id="5122" name="Picture 2"/>
-          <p:cNvPicPr>
-            <a:picLocks noChangeAspect="1" noChangeArrowheads="1"/>
-          </p:cNvPicPr>
-          <p:nvPr>
-            <p:custDataLst>
-              <p:tags r:id="rId3"/>
-            </p:custDataLst>
-          </p:nvPr>
-        </p:nvPicPr>
-        <p:blipFill>
-          <a:blip r:embed="rId6">
-            <a:extLst>
-              <a:ext uri="{28A0092B-C50C-407E-A947-70E740481C1C}">
-                <a14:useLocalDpi xmlns:a14="http://schemas.microsoft.com/office/drawing/2010/main" val="0"/>
-              </a:ext>
-            </a:extLst>
-          </a:blip>
-          <a:srcRect/>
-          <a:stretch>
-            <a:fillRect/>
-          </a:stretch>
-        </p:blipFill>
-        <p:spPr bwMode="auto">
-          <a:xfrm>
-            <a:off x="4191000" y="1143000"/>
-            <a:ext cx="4822896" cy="3505200"/>
-          </a:xfrm>
-          <a:prstGeom prst="rect">
-            <a:avLst/>
-          </a:prstGeom>
-          <a:noFill/>
-          <a:ln>
-            <a:noFill/>
-          </a:ln>
-          <a:effectLst>
-            <a:glow rad="63500">
-              <a:schemeClr val="accent4">
-                <a:satMod val="175000"/>
-                <a:alpha val="40000"/>
-              </a:schemeClr>
-            </a:glow>
-            <a:outerShdw dist="35921" dir="2700000" algn="ctr" rotWithShape="0">
-              <a:schemeClr val="bg2"/>
-            </a:outerShdw>
-          </a:effectLst>
-          <a:extLst>
-            <a:ext uri="{909E8E84-426E-40DD-AFC4-6F175D3DCCD1}">
-              <a14:hiddenFill xmlns:a14="http://schemas.microsoft.com/office/drawing/2010/main">
-                <a:solidFill>
-                  <a:schemeClr val="accent1"/>
-                </a:solidFill>
-              </a14:hiddenFill>
-            </a:ext>
-            <a:ext uri="{91240B29-F687-4F45-9708-019B960494DF}">
-              <a14:hiddenLine xmlns:a14="http://schemas.microsoft.com/office/drawing/2010/main" w="9525">
-                <a:solidFill>
-                  <a:schemeClr val="tx1"/>
-                </a:solidFill>
-                <a:miter lim="800000"/>
-                <a:headEnd/>
-                <a:tailEnd/>
-              </a14:hiddenLine>
-            </a:ext>
-          </a:extLst>
-        </p:spPr>
-      </p:pic>
-    </p:spTree>
-    <p:custDataLst>
-      <p:tags r:id="rId1"/>
-    </p:custDataLst>
-  </p:cSld>
-  <p:clrMapOvr>
-    <a:masterClrMapping/>
-  </p:clrMapOvr>
-  <p:timing>
-    <p:tnLst>
-      <p:par>
-        <p:cTn id="1" dur="indefinite" restart="never" nodeType="tmRoot"/>
-      </p:par>
-    </p:tnLst>
-  </p:timing>
-</p:sld>
-</file>
-
-<file path=ppt/slides/slide13.xml><?xml version="1.0" encoding="utf-8"?>
-<p:sld xmlns:a="http://schemas.openxmlformats.org/drawingml/2006/main" xmlns:r="http://schemas.openxmlformats.org/officeDocument/2006/relationships" xmlns:p="http://schemas.openxmlformats.org/presentationml/2006/main">
-  <p:cSld>
-    <p:bg>
-      <p:bgPr>
-        <a:blipFill dpi="0" rotWithShape="1">
-          <a:blip r:embed="rId5">
-            <a:lum/>
-          </a:blip>
-          <a:srcRect/>
-          <a:stretch>
-            <a:fillRect l="-6000" r="-6000"/>
-          </a:stretch>
-        </a:blipFill>
-        <a:effectLst/>
-      </p:bgPr>
-    </p:bg>
-    <p:spTree>
-      <p:nvGrpSpPr>
-        <p:cNvPr id="1" name=""/>
-        <p:cNvGrpSpPr/>
-        <p:nvPr/>
-      </p:nvGrpSpPr>
-      <p:grpSpPr>
-        <a:xfrm>
-          <a:off x="0" y="0"/>
-          <a:ext cx="0" cy="0"/>
-          <a:chOff x="0" y="0"/>
-          <a:chExt cx="0" cy="0"/>
-        </a:xfrm>
-      </p:grpSpPr>
-      <p:sp>
-        <p:nvSpPr>
-          <p:cNvPr id="4" name="Text Placeholder 2"/>
-          <p:cNvSpPr txBox="1">
-            <a:spLocks/>
-          </p:cNvSpPr>
-          <p:nvPr>
-            <p:custDataLst>
-              <p:tags r:id="rId2"/>
-            </p:custDataLst>
-          </p:nvPr>
-        </p:nvSpPr>
-        <p:spPr bwMode="auto">
-          <a:xfrm>
-            <a:off x="685800" y="4724400"/>
-            <a:ext cx="7772400" cy="1500187"/>
-          </a:xfrm>
-          <a:prstGeom prst="rect">
-            <a:avLst/>
-          </a:prstGeom>
-          <a:noFill/>
-          <a:ln w="9525">
-            <a:noFill/>
-            <a:miter lim="800000"/>
-            <a:headEnd/>
-            <a:tailEnd/>
-          </a:ln>
-        </p:spPr>
-        <p:txBody>
-          <a:bodyPr vert="horz" wrap="square" lIns="91440" tIns="45720" rIns="91440" bIns="45720" numCol="1" anchor="b" anchorCtr="0" compatLnSpc="1">
-            <a:prstTxWarp prst="textNoShape">
-              <a:avLst/>
-            </a:prstTxWarp>
-          </a:bodyPr>
-          <a:lstStyle/>
-          <a:p>
-            <a:pPr marL="0" marR="0" lvl="0" indent="0" algn="ctr" defTabSz="914400" rtl="0" eaLnBrk="1" fontAlgn="base" latinLnBrk="0" hangingPunct="1">
-              <a:lnSpc>
-                <a:spcPct val="100000"/>
-              </a:lnSpc>
-              <a:spcBef>
-                <a:spcPct val="20000"/>
-              </a:spcBef>
-              <a:spcAft>
-                <a:spcPct val="0"/>
-              </a:spcAft>
-              <a:buClrTx/>
-              <a:buSzTx/>
-              <a:buFontTx/>
-              <a:buNone/>
-              <a:tabLst/>
-              <a:defRPr/>
-            </a:pPr>
-            <a:endParaRPr kumimoji="0" lang="en-US" sz="5400" b="0" i="0" u="none" strike="noStrike" kern="0" cap="none" spc="0" normalizeH="0" baseline="0" noProof="0" dirty="0">
-              <a:ln>
-                <a:noFill/>
-              </a:ln>
-              <a:solidFill>
-                <a:srgbClr val="1C5287"/>
-              </a:solidFill>
-              <a:effectLst/>
-              <a:uLnTx/>
-              <a:uFillTx/>
-              <a:latin typeface="+mn-lt"/>
-              <a:ea typeface="+mn-ea"/>
-              <a:cs typeface="+mn-cs"/>
-            </a:endParaRPr>
-          </a:p>
-        </p:txBody>
-      </p:sp>
-    </p:spTree>
-    <p:custDataLst>
-      <p:tags r:id="rId1"/>
-    </p:custDataLst>
-  </p:cSld>
-  <p:clrMapOvr>
-    <a:masterClrMapping/>
-  </p:clrMapOvr>
-  <p:timing>
-    <p:tnLst>
-      <p:par>
-        <p:cTn id="1" dur="indefinite" restart="never" nodeType="tmRoot"/>
-      </p:par>
-    </p:tnLst>
-  </p:timing>
-</p:sld>
-</file>
-
-<file path=ppt/slides/slide2.xml><?xml version="1.0" encoding="utf-8"?>
-<p:sld xmlns:a="http://schemas.openxmlformats.org/drawingml/2006/main" xmlns:r="http://schemas.openxmlformats.org/officeDocument/2006/relationships" xmlns:p="http://schemas.openxmlformats.org/presentationml/2006/main">
-  <p:cSld>
-    <p:bg>
-      <p:bgPr>
-        <a:blipFill dpi="0" rotWithShape="1">
-          <a:blip r:embed="rId2">
-            <a:lum/>
-          </a:blip>
-          <a:srcRect/>
-          <a:stretch>
-            <a:fillRect l="-6000" r="-6000"/>
-          </a:stretch>
-        </a:blipFill>
-        <a:effectLst/>
-      </p:bgPr>
-    </p:bg>
-    <p:spTree>
-      <p:nvGrpSpPr>
-        <p:cNvPr id="1" name=""/>
-        <p:cNvGrpSpPr/>
-        <p:nvPr/>
-      </p:nvGrpSpPr>
-      <p:grpSpPr>
-        <a:xfrm>
-          <a:off x="0" y="0"/>
-          <a:ext cx="0" cy="0"/>
-          <a:chOff x="0" y="0"/>
-          <a:chExt cx="0" cy="0"/>
-        </a:xfrm>
-      </p:grpSpPr>
-    </p:spTree>
-    <p:extLst>
-      <p:ext uri="{BB962C8B-B14F-4D97-AF65-F5344CB8AC3E}">
-        <p14:creationId xmlns:p14="http://schemas.microsoft.com/office/powerpoint/2010/main" val="753395393"/>
-      </p:ext>
-    </p:extLst>
-  </p:cSld>
-  <p:clrMapOvr>
-    <a:masterClrMapping/>
-  </p:clrMapOvr>
-  <p:timing>
-    <p:tnLst>
-      <p:par>
-        <p:cTn id="1" dur="indefinite" restart="never" nodeType="tmRoot"/>
-      </p:par>
-    </p:tnLst>
-  </p:timing>
-</p:sld>
-</file>
-
-<file path=ppt/slides/slide3.xml><?xml version="1.0" encoding="utf-8"?>
-<p:sld xmlns:a="http://schemas.openxmlformats.org/drawingml/2006/main" xmlns:r="http://schemas.openxmlformats.org/officeDocument/2006/relationships" xmlns:p="http://schemas.openxmlformats.org/presentationml/2006/main">
-  <p:cSld>
-    <p:bg>
-      <p:bgPr>
-        <a:blipFill dpi="0" rotWithShape="1">
-          <a:blip r:embed="rId2">
-            <a:lum/>
-          </a:blip>
-          <a:srcRect/>
-          <a:stretch>
-            <a:fillRect/>
-          </a:stretch>
-        </a:blipFill>
-        <a:effectLst/>
-      </p:bgPr>
-    </p:bg>
-    <p:spTree>
-      <p:nvGrpSpPr>
-        <p:cNvPr id="1" name=""/>
-        <p:cNvGrpSpPr/>
-        <p:nvPr/>
-      </p:nvGrpSpPr>
-      <p:grpSpPr>
-        <a:xfrm>
-          <a:off x="0" y="0"/>
-          <a:ext cx="0" cy="0"/>
-          <a:chOff x="0" y="0"/>
-          <a:chExt cx="0" cy="0"/>
-        </a:xfrm>
-      </p:grpSpPr>
-      <p:sp>
-        <p:nvSpPr>
-          <p:cNvPr id="2" name="&quot;No&quot; Symbol 1"/>
-          <p:cNvSpPr/>
-          <p:nvPr/>
-        </p:nvSpPr>
-        <p:spPr>
-          <a:xfrm>
-            <a:off x="1566553" y="381000"/>
-            <a:ext cx="6400800" cy="6096000"/>
-          </a:xfrm>
-          <a:prstGeom prst="noSmoking">
-            <a:avLst/>
-          </a:prstGeom>
-        </p:spPr>
-        <p:style>
-          <a:lnRef idx="2">
-            <a:schemeClr val="accent2">
-              <a:shade val="50000"/>
-            </a:schemeClr>
-          </a:lnRef>
-          <a:fillRef idx="1">
-            <a:schemeClr val="accent2"/>
-          </a:fillRef>
-          <a:effectRef idx="0">
-            <a:schemeClr val="accent2"/>
-          </a:effectRef>
-          <a:fontRef idx="minor">
-            <a:schemeClr val="lt1"/>
-          </a:fontRef>
-        </p:style>
-        <p:txBody>
-          <a:bodyPr rtlCol="0" anchor="ctr"/>
-          <a:lstStyle/>
-          <a:p>
-            <a:pPr algn="ctr"/>
-            <a:endParaRPr lang="en-US">
-              <a:solidFill>
-                <a:schemeClr val="tx1"/>
-              </a:solidFill>
-            </a:endParaRPr>
-          </a:p>
-        </p:txBody>
-      </p:sp>
-    </p:spTree>
-    <p:extLst>
-      <p:ext uri="{BB962C8B-B14F-4D97-AF65-F5344CB8AC3E}">
-        <p14:creationId xmlns:p14="http://schemas.microsoft.com/office/powerpoint/2010/main" val="2238471607"/>
-      </p:ext>
-    </p:extLst>
-  </p:cSld>
-  <p:clrMapOvr>
-    <a:masterClrMapping/>
-  </p:clrMapOvr>
-  <p:timing>
-    <p:tnLst>
-      <p:par>
-        <p:cTn id="1" dur="indefinite" restart="never" nodeType="tmRoot">
-          <p:childTnLst>
-            <p:seq concurrent="1" nextAc="seek">
-              <p:cTn id="2" dur="indefinite" nodeType="mainSeq">
-                <p:childTnLst>
-                  <p:par>
-                    <p:cTn id="3" fill="hold">
-                      <p:stCondLst>
-                        <p:cond delay="indefinite"/>
-                      </p:stCondLst>
-                      <p:childTnLst>
-                        <p:par>
-                          <p:cTn id="4" fill="hold">
-                            <p:stCondLst>
-                              <p:cond delay="0"/>
-                            </p:stCondLst>
-                            <p:childTnLst>
-                              <p:par>
-                                <p:cTn id="5" presetID="1" presetClass="entr" presetSubtype="0" fill="hold" grpId="0" nodeType="clickEffect">
-                                  <p:stCondLst>
-                                    <p:cond delay="0"/>
-                                  </p:stCondLst>
-                                  <p:childTnLst>
-                                    <p:set>
-                                      <p:cBhvr>
-                                        <p:cTn id="6" dur="1" fill="hold">
-                                          <p:stCondLst>
-                                            <p:cond delay="0"/>
-                                          </p:stCondLst>
-                                        </p:cTn>
-                                        <p:tgtEl>
-                                          <p:spTgt spid="2"/>
-                                        </p:tgtEl>
-                                        <p:attrNameLst>
-                                          <p:attrName>style.visibility</p:attrName>
-                                        </p:attrNameLst>
-                                      </p:cBhvr>
-                                      <p:to>
-                                        <p:strVal val="visible"/>
-                                      </p:to>
-                                    </p:set>
-                                  </p:childTnLst>
-                                </p:cTn>
-                              </p:par>
-                            </p:childTnLst>
-                          </p:cTn>
-                        </p:par>
-                      </p:childTnLst>
-                    </p:cTn>
-                  </p:par>
-                </p:childTnLst>
-              </p:cTn>
-              <p:prevCondLst>
-                <p:cond evt="onPrev" delay="0">
-                  <p:tgtEl>
-                    <p:sldTgt/>
-                  </p:tgtEl>
-                </p:cond>
-              </p:prevCondLst>
-              <p:nextCondLst>
-                <p:cond evt="onNext" delay="0">
-                  <p:tgtEl>
-                    <p:sldTgt/>
-                  </p:tgtEl>
-                </p:cond>
-              </p:nextCondLst>
-            </p:seq>
-          </p:childTnLst>
-        </p:cTn>
-      </p:par>
-    </p:tnLst>
-    <p:bldLst>
-      <p:bldP spid="2" grpId="0" animBg="1"/>
-    </p:bldLst>
-  </p:timing>
-</p:sld>
-</file>
-
-<file path=ppt/slides/slide4.xml><?xml version="1.0" encoding="utf-8"?>
-<p:sld xmlns:a="http://schemas.openxmlformats.org/drawingml/2006/main" xmlns:r="http://schemas.openxmlformats.org/officeDocument/2006/relationships" xmlns:p="http://schemas.openxmlformats.org/presentationml/2006/main">
-  <p:cSld>
-    <p:spTree>
-      <p:nvGrpSpPr>
-        <p:cNvPr id="1" name=""/>
-        <p:cNvGrpSpPr/>
-        <p:nvPr/>
-      </p:nvGrpSpPr>
-      <p:grpSpPr>
-        <a:xfrm>
-          <a:off x="0" y="0"/>
-          <a:ext cx="0" cy="0"/>
-          <a:chOff x="0" y="0"/>
-          <a:chExt cx="0" cy="0"/>
-        </a:xfrm>
-      </p:grpSpPr>
-      <p:sp>
-        <p:nvSpPr>
-          <p:cNvPr id="2" name="Title 1"/>
-          <p:cNvSpPr>
-            <a:spLocks noGrp="1"/>
-          </p:cNvSpPr>
-          <p:nvPr>
-            <p:ph type="ctrTitle"/>
-            <p:custDataLst>
-              <p:tags r:id="rId2"/>
-            </p:custDataLst>
-          </p:nvPr>
-        </p:nvSpPr>
-        <p:spPr>
-          <a:xfrm>
-            <a:off x="457200" y="1524000"/>
-            <a:ext cx="8382000" cy="609600"/>
-          </a:xfrm>
-        </p:spPr>
-        <p:txBody>
-          <a:bodyPr>
-            <a:normAutofit fontScale="90000"/>
-          </a:bodyPr>
-          <a:lstStyle/>
-          <a:p>
-            <a:pPr algn="l"/>
-            <a:r>
-              <a:rPr lang="en-US" b="1" dirty="0">
-                <a:latin typeface="Verdana" pitchFamily="34" charset="0"/>
-                <a:ea typeface="Verdana" pitchFamily="34" charset="0"/>
-                <a:cs typeface="Verdana" pitchFamily="34" charset="0"/>
-              </a:rPr>
-              <a:t>Functional Testing with ASP.NET </a:t>
-            </a:r>
-            <a:r>
-              <a:rPr lang="en-US" b="1" dirty="0" smtClean="0">
-                <a:latin typeface="Verdana" pitchFamily="34" charset="0"/>
-                <a:ea typeface="Verdana" pitchFamily="34" charset="0"/>
-                <a:cs typeface="Verdana" pitchFamily="34" charset="0"/>
-              </a:rPr>
-              <a:t>MVC</a:t>
-            </a:r>
-            <a:br>
-              <a:rPr lang="en-US" b="1" dirty="0" smtClean="0">
-                <a:latin typeface="Verdana" pitchFamily="34" charset="0"/>
-                <a:ea typeface="Verdana" pitchFamily="34" charset="0"/>
-                <a:cs typeface="Verdana" pitchFamily="34" charset="0"/>
-              </a:rPr>
-            </a:br>
-            <a:r>
-              <a:rPr lang="en-US" b="1" dirty="0">
-                <a:latin typeface="Verdana" pitchFamily="34" charset="0"/>
-                <a:ea typeface="Verdana" pitchFamily="34" charset="0"/>
-                <a:cs typeface="Verdana" pitchFamily="34" charset="0"/>
-              </a:rPr>
-              <a:t/>
-            </a:r>
-            <a:br>
-              <a:rPr lang="en-US" b="1" dirty="0">
-                <a:latin typeface="Verdana" pitchFamily="34" charset="0"/>
-                <a:ea typeface="Verdana" pitchFamily="34" charset="0"/>
-                <a:cs typeface="Verdana" pitchFamily="34" charset="0"/>
-              </a:rPr>
-            </a:br>
-            <a:r>
-              <a:rPr lang="en-US" sz="3600" b="1" dirty="0" smtClean="0">
-                <a:latin typeface="Verdana" pitchFamily="34" charset="0"/>
-                <a:ea typeface="Verdana" pitchFamily="34" charset="0"/>
-                <a:cs typeface="Verdana" pitchFamily="34" charset="0"/>
-              </a:rPr>
-              <a:t>Jimmy </a:t>
-            </a:r>
-            <a:r>
-              <a:rPr lang="en-US" sz="3600" b="1" dirty="0" err="1" smtClean="0">
-                <a:latin typeface="Verdana" pitchFamily="34" charset="0"/>
-                <a:ea typeface="Verdana" pitchFamily="34" charset="0"/>
-                <a:cs typeface="Verdana" pitchFamily="34" charset="0"/>
-              </a:rPr>
-              <a:t>Bogard</a:t>
-            </a:r>
-            <a:r>
-              <a:rPr lang="en-US" sz="3600" b="1" dirty="0" smtClean="0">
-                <a:latin typeface="Verdana" pitchFamily="34" charset="0"/>
-                <a:ea typeface="Verdana" pitchFamily="34" charset="0"/>
-                <a:cs typeface="Verdana" pitchFamily="34" charset="0"/>
-              </a:rPr>
-              <a:t> - @</a:t>
-            </a:r>
-            <a:r>
-              <a:rPr lang="en-US" sz="3600" b="1" dirty="0" err="1" smtClean="0">
-                <a:latin typeface="Verdana" pitchFamily="34" charset="0"/>
-                <a:ea typeface="Verdana" pitchFamily="34" charset="0"/>
-                <a:cs typeface="Verdana" pitchFamily="34" charset="0"/>
-              </a:rPr>
-              <a:t>jbogard</a:t>
-            </a:r>
-            <a:r>
-              <a:rPr lang="en-US" sz="3600" b="1" dirty="0" smtClean="0">
-                <a:latin typeface="Verdana" pitchFamily="34" charset="0"/>
-                <a:ea typeface="Verdana" pitchFamily="34" charset="0"/>
-                <a:cs typeface="Verdana" pitchFamily="34" charset="0"/>
-              </a:rPr>
-              <a:t/>
-            </a:r>
-            <a:br>
-              <a:rPr lang="en-US" sz="3600" b="1" dirty="0" smtClean="0">
-                <a:latin typeface="Verdana" pitchFamily="34" charset="0"/>
-                <a:ea typeface="Verdana" pitchFamily="34" charset="0"/>
-                <a:cs typeface="Verdana" pitchFamily="34" charset="0"/>
-              </a:rPr>
-            </a:br>
-            <a:r>
-              <a:rPr lang="en-US" sz="3600" b="1" dirty="0" smtClean="0">
-                <a:latin typeface="Verdana" pitchFamily="34" charset="0"/>
-                <a:ea typeface="Verdana" pitchFamily="34" charset="0"/>
-                <a:cs typeface="Verdana" pitchFamily="34" charset="0"/>
-              </a:rPr>
-              <a:t>jimmybogard.lostechies.com</a:t>
-            </a:r>
-            <a:r>
-              <a:rPr lang="en-US" sz="3600" b="1" dirty="0" smtClean="0">
-                <a:latin typeface="Verdana" pitchFamily="34" charset="0"/>
-                <a:ea typeface="Verdana" pitchFamily="34" charset="0"/>
-                <a:cs typeface="Verdana" pitchFamily="34" charset="0"/>
-              </a:rPr>
-              <a:t/>
-            </a:r>
             <a:br>
               <a:rPr lang="en-US" sz="3600" b="1" dirty="0" smtClean="0">
                 <a:latin typeface="Verdana" pitchFamily="34" charset="0"/>
@@ -6661,7 +5371,126 @@
 </p:sld>
 </file>
 
-<file path=ppt/slides/slide5.xml><?xml version="1.0" encoding="utf-8"?>
+<file path=ppt/slides/slide10.xml><?xml version="1.0" encoding="utf-8"?>
+<p:sld xmlns:a="http://schemas.openxmlformats.org/drawingml/2006/main" xmlns:r="http://schemas.openxmlformats.org/officeDocument/2006/relationships" xmlns:p="http://schemas.openxmlformats.org/presentationml/2006/main">
+  <p:cSld>
+    <p:bg>
+      <p:bgPr>
+        <a:blipFill dpi="0" rotWithShape="1">
+          <a:blip r:embed="rId5">
+            <a:lum/>
+          </a:blip>
+          <a:srcRect/>
+          <a:stretch>
+            <a:fillRect l="-6000" r="-6000"/>
+          </a:stretch>
+        </a:blipFill>
+        <a:effectLst/>
+      </p:bgPr>
+    </p:bg>
+    <p:spTree>
+      <p:nvGrpSpPr>
+        <p:cNvPr id="1" name=""/>
+        <p:cNvGrpSpPr/>
+        <p:nvPr/>
+      </p:nvGrpSpPr>
+      <p:grpSpPr>
+        <a:xfrm>
+          <a:off x="0" y="0"/>
+          <a:ext cx="0" cy="0"/>
+          <a:chOff x="0" y="0"/>
+          <a:chExt cx="0" cy="0"/>
+        </a:xfrm>
+      </p:grpSpPr>
+      <p:sp>
+        <p:nvSpPr>
+          <p:cNvPr id="4" name="Text Placeholder 2"/>
+          <p:cNvSpPr txBox="1">
+            <a:spLocks/>
+          </p:cNvSpPr>
+          <p:nvPr>
+            <p:custDataLst>
+              <p:tags r:id="rId2"/>
+            </p:custDataLst>
+          </p:nvPr>
+        </p:nvSpPr>
+        <p:spPr bwMode="auto">
+          <a:xfrm>
+            <a:off x="685800" y="4724400"/>
+            <a:ext cx="7772400" cy="1500187"/>
+          </a:xfrm>
+          <a:prstGeom prst="rect">
+            <a:avLst/>
+          </a:prstGeom>
+          <a:noFill/>
+          <a:ln w="9525">
+            <a:noFill/>
+            <a:miter lim="800000"/>
+            <a:headEnd/>
+            <a:tailEnd/>
+          </a:ln>
+        </p:spPr>
+        <p:txBody>
+          <a:bodyPr vert="horz" wrap="square" lIns="91440" tIns="45720" rIns="91440" bIns="45720" numCol="1" anchor="b" anchorCtr="0" compatLnSpc="1">
+            <a:prstTxWarp prst="textNoShape">
+              <a:avLst/>
+            </a:prstTxWarp>
+          </a:bodyPr>
+          <a:lstStyle/>
+          <a:p>
+            <a:pPr marL="0" marR="0" lvl="0" indent="0" algn="ctr" defTabSz="914400" rtl="0" eaLnBrk="1" fontAlgn="base" latinLnBrk="0" hangingPunct="1">
+              <a:lnSpc>
+                <a:spcPct val="100000"/>
+              </a:lnSpc>
+              <a:spcBef>
+                <a:spcPct val="20000"/>
+              </a:spcBef>
+              <a:spcAft>
+                <a:spcPct val="0"/>
+              </a:spcAft>
+              <a:buClrTx/>
+              <a:buSzTx/>
+              <a:buFontTx/>
+              <a:buNone/>
+              <a:tabLst/>
+              <a:defRPr/>
+            </a:pPr>
+            <a:endParaRPr kumimoji="0" lang="en-US" sz="5400" b="0" i="0" u="none" strike="noStrike" kern="0" cap="none" spc="0" normalizeH="0" baseline="0" noProof="0" dirty="0">
+              <a:ln>
+                <a:noFill/>
+              </a:ln>
+              <a:solidFill>
+                <a:srgbClr val="1C5287"/>
+              </a:solidFill>
+              <a:effectLst/>
+              <a:uLnTx/>
+              <a:uFillTx/>
+              <a:latin typeface="+mn-lt"/>
+              <a:ea typeface="+mn-ea"/>
+              <a:cs typeface="+mn-cs"/>
+            </a:endParaRPr>
+          </a:p>
+        </p:txBody>
+      </p:sp>
+    </p:spTree>
+    <p:custDataLst>
+      <p:tags r:id="rId1"/>
+    </p:custDataLst>
+  </p:cSld>
+  <p:clrMapOvr>
+    <a:masterClrMapping/>
+  </p:clrMapOvr>
+  <p:timing>
+    <p:tnLst>
+      <p:par>
+        <p:cTn id="1" dur="indefinite" restart="never" nodeType="tmRoot"/>
+      </p:par>
+    </p:tnLst>
+  </p:timing>
+</p:sld>
+</file>
+
+<file path=ppt/slides/slide2.xml><?xml version="1.0" encoding="utf-8"?>
 <p:sld xmlns:a="http://schemas.openxmlformats.org/drawingml/2006/main" xmlns:r="http://schemas.openxmlformats.org/officeDocument/2006/relationships" xmlns:p="http://schemas.openxmlformats.org/presentationml/2006/main">
   <p:cSld>
     <p:spTree>
@@ -6733,7 +5562,7 @@
 </p:sld>
 </file>
 
-<file path=ppt/slides/slide6.xml><?xml version="1.0" encoding="utf-8"?>
+<file path=ppt/slides/slide3.xml><?xml version="1.0" encoding="utf-8"?>
 <p:sld xmlns:a="http://schemas.openxmlformats.org/drawingml/2006/main" xmlns:r="http://schemas.openxmlformats.org/officeDocument/2006/relationships" xmlns:p="http://schemas.openxmlformats.org/presentationml/2006/main">
   <p:cSld>
     <p:spTree>
@@ -6837,7 +5666,7 @@
 </p:sld>
 </file>
 
-<file path=ppt/slides/slide7.xml><?xml version="1.0" encoding="utf-8"?>
+<file path=ppt/slides/slide4.xml><?xml version="1.0" encoding="utf-8"?>
 <p:sld xmlns:a="http://schemas.openxmlformats.org/drawingml/2006/main" xmlns:r="http://schemas.openxmlformats.org/officeDocument/2006/relationships" xmlns:p="http://schemas.openxmlformats.org/presentationml/2006/main">
   <p:cSld>
     <p:spTree>
@@ -6941,7 +5770,7 @@
 </p:sld>
 </file>
 
-<file path=ppt/slides/slide8.xml><?xml version="1.0" encoding="utf-8"?>
+<file path=ppt/slides/slide5.xml><?xml version="1.0" encoding="utf-8"?>
 <p:sld xmlns:a="http://schemas.openxmlformats.org/drawingml/2006/main" xmlns:r="http://schemas.openxmlformats.org/officeDocument/2006/relationships" xmlns:p="http://schemas.openxmlformats.org/presentationml/2006/main">
   <p:cSld>
     <p:spTree>
@@ -7045,7 +5874,7 @@
 </p:sld>
 </file>
 
-<file path=ppt/slides/slide9.xml><?xml version="1.0" encoding="utf-8"?>
+<file path=ppt/slides/slide6.xml><?xml version="1.0" encoding="utf-8"?>
 <p:sld xmlns:a="http://schemas.openxmlformats.org/drawingml/2006/main" xmlns:r="http://schemas.openxmlformats.org/officeDocument/2006/relationships" xmlns:p="http://schemas.openxmlformats.org/presentationml/2006/main">
   <p:cSld>
     <p:spTree>
@@ -7117,6 +5946,559 @@
 </p:sld>
 </file>
 
+<file path=ppt/slides/slide7.xml><?xml version="1.0" encoding="utf-8"?>
+<p:sld xmlns:a="http://schemas.openxmlformats.org/drawingml/2006/main" xmlns:r="http://schemas.openxmlformats.org/officeDocument/2006/relationships" xmlns:p="http://schemas.openxmlformats.org/presentationml/2006/main">
+  <p:cSld>
+    <p:spTree>
+      <p:nvGrpSpPr>
+        <p:cNvPr id="1" name=""/>
+        <p:cNvGrpSpPr/>
+        <p:nvPr/>
+      </p:nvGrpSpPr>
+      <p:grpSpPr>
+        <a:xfrm>
+          <a:off x="0" y="0"/>
+          <a:ext cx="0" cy="0"/>
+          <a:chOff x="0" y="0"/>
+          <a:chExt cx="0" cy="0"/>
+        </a:xfrm>
+      </p:grpSpPr>
+      <p:pic>
+        <p:nvPicPr>
+          <p:cNvPr id="1026" name="Picture 2" descr="Selenium Logo"/>
+          <p:cNvPicPr>
+            <a:picLocks noChangeAspect="1" noChangeArrowheads="1"/>
+          </p:cNvPicPr>
+          <p:nvPr>
+            <p:custDataLst>
+              <p:tags r:id="rId2"/>
+            </p:custDataLst>
+          </p:nvPr>
+        </p:nvPicPr>
+        <p:blipFill>
+          <a:blip r:embed="rId8">
+            <a:extLst>
+              <a:ext uri="{28A0092B-C50C-407E-A947-70E740481C1C}">
+                <a14:useLocalDpi xmlns:a14="http://schemas.microsoft.com/office/drawing/2010/main" val="0"/>
+              </a:ext>
+            </a:extLst>
+          </a:blip>
+          <a:srcRect/>
+          <a:stretch>
+            <a:fillRect/>
+          </a:stretch>
+        </p:blipFill>
+        <p:spPr bwMode="auto">
+          <a:xfrm>
+            <a:off x="1905000" y="609599"/>
+            <a:ext cx="1905000" cy="1724025"/>
+          </a:xfrm>
+          <a:prstGeom prst="rect">
+            <a:avLst/>
+          </a:prstGeom>
+          <a:noFill/>
+          <a:extLst>
+            <a:ext uri="{909E8E84-426E-40DD-AFC4-6F175D3DCCD1}">
+              <a14:hiddenFill xmlns:a14="http://schemas.microsoft.com/office/drawing/2010/main">
+                <a:solidFill>
+                  <a:srgbClr val="FFFFFF"/>
+                </a:solidFill>
+              </a14:hiddenFill>
+            </a:ext>
+          </a:extLst>
+        </p:spPr>
+      </p:pic>
+      <p:pic>
+        <p:nvPicPr>
+          <p:cNvPr id="1028" name="Picture 4" descr="Icon for package NUnit"/>
+          <p:cNvPicPr>
+            <a:picLocks noChangeAspect="1" noChangeArrowheads="1"/>
+          </p:cNvPicPr>
+          <p:nvPr>
+            <p:custDataLst>
+              <p:tags r:id="rId3"/>
+            </p:custDataLst>
+          </p:nvPr>
+        </p:nvPicPr>
+        <p:blipFill>
+          <a:blip r:embed="rId9">
+            <a:extLst>
+              <a:ext uri="{28A0092B-C50C-407E-A947-70E740481C1C}">
+                <a14:useLocalDpi xmlns:a14="http://schemas.microsoft.com/office/drawing/2010/main" val="0"/>
+              </a:ext>
+            </a:extLst>
+          </a:blip>
+          <a:srcRect/>
+          <a:stretch>
+            <a:fillRect/>
+          </a:stretch>
+        </p:blipFill>
+        <p:spPr bwMode="auto">
+          <a:xfrm>
+            <a:off x="5791200" y="1509712"/>
+            <a:ext cx="1981200" cy="1981207"/>
+          </a:xfrm>
+          <a:prstGeom prst="rect">
+            <a:avLst/>
+          </a:prstGeom>
+          <a:noFill/>
+          <a:extLst>
+            <a:ext uri="{909E8E84-426E-40DD-AFC4-6F175D3DCCD1}">
+              <a14:hiddenFill xmlns:a14="http://schemas.microsoft.com/office/drawing/2010/main">
+                <a:solidFill>
+                  <a:srgbClr val="FFFFFF"/>
+                </a:solidFill>
+              </a14:hiddenFill>
+            </a:ext>
+          </a:extLst>
+        </p:spPr>
+      </p:pic>
+      <p:pic>
+        <p:nvPicPr>
+          <p:cNvPr id="8" name="Picture 2"/>
+          <p:cNvPicPr>
+            <a:picLocks noChangeAspect="1" noChangeArrowheads="1"/>
+          </p:cNvPicPr>
+          <p:nvPr>
+            <p:custDataLst>
+              <p:tags r:id="rId4"/>
+            </p:custDataLst>
+          </p:nvPr>
+        </p:nvPicPr>
+        <p:blipFill>
+          <a:blip r:embed="rId10" cstate="print"/>
+          <a:srcRect/>
+          <a:stretch>
+            <a:fillRect/>
+          </a:stretch>
+        </p:blipFill>
+        <p:spPr bwMode="auto">
+          <a:xfrm>
+            <a:off x="4048125" y="4648200"/>
+            <a:ext cx="4095750" cy="1534045"/>
+          </a:xfrm>
+          <a:prstGeom prst="rect">
+            <a:avLst/>
+          </a:prstGeom>
+          <a:noFill/>
+          <a:ln w="9525">
+            <a:noFill/>
+            <a:miter lim="800000"/>
+            <a:headEnd/>
+            <a:tailEnd/>
+          </a:ln>
+          <a:effectLst/>
+        </p:spPr>
+      </p:pic>
+      <p:pic>
+        <p:nvPicPr>
+          <p:cNvPr id="1029" name="Picture 5"/>
+          <p:cNvPicPr>
+            <a:picLocks noChangeAspect="1" noChangeArrowheads="1"/>
+          </p:cNvPicPr>
+          <p:nvPr>
+            <p:custDataLst>
+              <p:tags r:id="rId5"/>
+            </p:custDataLst>
+          </p:nvPr>
+        </p:nvPicPr>
+        <p:blipFill>
+          <a:blip r:embed="rId11">
+            <a:extLst>
+              <a:ext uri="{28A0092B-C50C-407E-A947-70E740481C1C}">
+                <a14:useLocalDpi xmlns:a14="http://schemas.microsoft.com/office/drawing/2010/main" val="0"/>
+              </a:ext>
+            </a:extLst>
+          </a:blip>
+          <a:srcRect/>
+          <a:stretch>
+            <a:fillRect/>
+          </a:stretch>
+        </p:blipFill>
+        <p:spPr bwMode="auto">
+          <a:xfrm>
+            <a:off x="1303401" y="3038474"/>
+            <a:ext cx="3497199" cy="1304925"/>
+          </a:xfrm>
+          <a:prstGeom prst="rect">
+            <a:avLst/>
+          </a:prstGeom>
+          <a:noFill/>
+          <a:ln>
+            <a:noFill/>
+          </a:ln>
+          <a:effectLst/>
+          <a:extLst>
+            <a:ext uri="{909E8E84-426E-40DD-AFC4-6F175D3DCCD1}">
+              <a14:hiddenFill xmlns:a14="http://schemas.microsoft.com/office/drawing/2010/main">
+                <a:solidFill>
+                  <a:schemeClr val="accent1"/>
+                </a:solidFill>
+              </a14:hiddenFill>
+            </a:ext>
+            <a:ext uri="{91240B29-F687-4F45-9708-019B960494DF}">
+              <a14:hiddenLine xmlns:a14="http://schemas.microsoft.com/office/drawing/2010/main" w="9525">
+                <a:solidFill>
+                  <a:schemeClr val="tx1"/>
+                </a:solidFill>
+                <a:miter lim="800000"/>
+                <a:headEnd/>
+                <a:tailEnd/>
+              </a14:hiddenLine>
+            </a:ext>
+            <a:ext uri="{AF507438-7753-43E0-B8FC-AC1667EBCBE1}">
+              <a14:hiddenEffects xmlns:a14="http://schemas.microsoft.com/office/drawing/2010/main">
+                <a:effectLst>
+                  <a:outerShdw dist="35921" dir="2700000" algn="ctr" rotWithShape="0">
+                    <a:schemeClr val="bg2"/>
+                  </a:outerShdw>
+                </a:effectLst>
+              </a14:hiddenEffects>
+            </a:ext>
+          </a:extLst>
+        </p:spPr>
+      </p:pic>
+    </p:spTree>
+    <p:custDataLst>
+      <p:tags r:id="rId1"/>
+    </p:custDataLst>
+  </p:cSld>
+  <p:clrMapOvr>
+    <a:masterClrMapping/>
+  </p:clrMapOvr>
+  <p:timing>
+    <p:tnLst>
+      <p:par>
+        <p:cTn id="1" dur="indefinite" restart="never" nodeType="tmRoot"/>
+      </p:par>
+    </p:tnLst>
+  </p:timing>
+</p:sld>
+</file>
+
+<file path=ppt/slides/slide8.xml><?xml version="1.0" encoding="utf-8"?>
+<p:sld xmlns:a="http://schemas.openxmlformats.org/drawingml/2006/main" xmlns:r="http://schemas.openxmlformats.org/officeDocument/2006/relationships" xmlns:p="http://schemas.openxmlformats.org/presentationml/2006/main">
+  <p:cSld>
+    <p:spTree>
+      <p:nvGrpSpPr>
+        <p:cNvPr id="1" name=""/>
+        <p:cNvGrpSpPr/>
+        <p:nvPr/>
+      </p:nvGrpSpPr>
+      <p:grpSpPr>
+        <a:xfrm>
+          <a:off x="0" y="0"/>
+          <a:ext cx="0" cy="0"/>
+          <a:chOff x="0" y="0"/>
+          <a:chExt cx="0" cy="0"/>
+        </a:xfrm>
+      </p:grpSpPr>
+      <p:pic>
+        <p:nvPicPr>
+          <p:cNvPr id="4100" name="Picture 4"/>
+          <p:cNvPicPr>
+            <a:picLocks noChangeAspect="1" noChangeArrowheads="1"/>
+          </p:cNvPicPr>
+          <p:nvPr>
+            <p:custDataLst>
+              <p:tags r:id="rId2"/>
+            </p:custDataLst>
+          </p:nvPr>
+        </p:nvPicPr>
+        <p:blipFill>
+          <a:blip r:embed="rId5">
+            <a:extLst>
+              <a:ext uri="{28A0092B-C50C-407E-A947-70E740481C1C}">
+                <a14:useLocalDpi xmlns:a14="http://schemas.microsoft.com/office/drawing/2010/main" val="0"/>
+              </a:ext>
+            </a:extLst>
+          </a:blip>
+          <a:srcRect/>
+          <a:stretch>
+            <a:fillRect/>
+          </a:stretch>
+        </p:blipFill>
+        <p:spPr bwMode="auto">
+          <a:xfrm>
+            <a:off x="228600" y="152400"/>
+            <a:ext cx="8702181" cy="6324600"/>
+          </a:xfrm>
+          <a:prstGeom prst="rect">
+            <a:avLst/>
+          </a:prstGeom>
+          <a:noFill/>
+          <a:ln>
+            <a:noFill/>
+          </a:ln>
+          <a:effectLst>
+            <a:glow rad="63500">
+              <a:schemeClr val="accent4">
+                <a:satMod val="175000"/>
+                <a:alpha val="40000"/>
+              </a:schemeClr>
+            </a:glow>
+            <a:outerShdw dist="35921" dir="2700000" algn="ctr" rotWithShape="0">
+              <a:schemeClr val="bg2"/>
+            </a:outerShdw>
+          </a:effectLst>
+          <a:extLst>
+            <a:ext uri="{909E8E84-426E-40DD-AFC4-6F175D3DCCD1}">
+              <a14:hiddenFill xmlns:a14="http://schemas.microsoft.com/office/drawing/2010/main">
+                <a:solidFill>
+                  <a:schemeClr val="accent1"/>
+                </a:solidFill>
+              </a14:hiddenFill>
+            </a:ext>
+            <a:ext uri="{91240B29-F687-4F45-9708-019B960494DF}">
+              <a14:hiddenLine xmlns:a14="http://schemas.microsoft.com/office/drawing/2010/main" w="9525">
+                <a:solidFill>
+                  <a:schemeClr val="tx1"/>
+                </a:solidFill>
+                <a:miter lim="800000"/>
+                <a:headEnd/>
+                <a:tailEnd/>
+              </a14:hiddenLine>
+            </a:ext>
+          </a:extLst>
+        </p:spPr>
+      </p:pic>
+    </p:spTree>
+    <p:custDataLst>
+      <p:tags r:id="rId1"/>
+    </p:custDataLst>
+  </p:cSld>
+  <p:clrMapOvr>
+    <a:masterClrMapping/>
+  </p:clrMapOvr>
+  <p:timing>
+    <p:tnLst>
+      <p:par>
+        <p:cTn id="1" dur="indefinite" restart="never" nodeType="tmRoot"/>
+      </p:par>
+    </p:tnLst>
+  </p:timing>
+</p:sld>
+</file>
+
+<file path=ppt/slides/slide9.xml><?xml version="1.0" encoding="utf-8"?>
+<p:sld xmlns:a="http://schemas.openxmlformats.org/drawingml/2006/main" xmlns:r="http://schemas.openxmlformats.org/officeDocument/2006/relationships" xmlns:p="http://schemas.openxmlformats.org/presentationml/2006/main">
+  <p:cSld>
+    <p:spTree>
+      <p:nvGrpSpPr>
+        <p:cNvPr id="1" name=""/>
+        <p:cNvGrpSpPr/>
+        <p:nvPr/>
+      </p:nvGrpSpPr>
+      <p:grpSpPr>
+        <a:xfrm>
+          <a:off x="0" y="0"/>
+          <a:ext cx="0" cy="0"/>
+          <a:chOff x="0" y="0"/>
+          <a:chExt cx="0" cy="0"/>
+        </a:xfrm>
+      </p:grpSpPr>
+      <p:sp>
+        <p:nvSpPr>
+          <p:cNvPr id="3" name="Content Placeholder 2"/>
+          <p:cNvSpPr>
+            <a:spLocks noGrp="1"/>
+          </p:cNvSpPr>
+          <p:nvPr>
+            <p:ph idx="1"/>
+            <p:custDataLst>
+              <p:tags r:id="rId2"/>
+            </p:custDataLst>
+          </p:nvPr>
+        </p:nvSpPr>
+        <p:spPr>
+          <a:xfrm>
+            <a:off x="228600" y="301748"/>
+            <a:ext cx="4038600" cy="6099051"/>
+          </a:xfrm>
+        </p:spPr>
+        <p:txBody>
+          <a:bodyPr>
+            <a:noAutofit/>
+          </a:bodyPr>
+          <a:lstStyle/>
+          <a:p>
+            <a:pPr>
+              <a:buFont typeface="+mj-lt"/>
+              <a:buAutoNum type="arabicPeriod"/>
+            </a:pPr>
+            <a:r>
+              <a:rPr lang="en-US" sz="2400" dirty="0" smtClean="0"/>
+              <a:t>Conferences link text could change</a:t>
+            </a:r>
+          </a:p>
+          <a:p>
+            <a:pPr>
+              <a:buFont typeface="+mj-lt"/>
+              <a:buAutoNum type="arabicPeriod"/>
+            </a:pPr>
+            <a:r>
+              <a:rPr lang="en-US" sz="2400" dirty="0" smtClean="0"/>
+              <a:t>Edit link text could change</a:t>
+            </a:r>
+          </a:p>
+          <a:p>
+            <a:pPr>
+              <a:buFont typeface="+mj-lt"/>
+              <a:buAutoNum type="arabicPeriod"/>
+            </a:pPr>
+            <a:r>
+              <a:rPr lang="en-US" sz="2400" dirty="0" smtClean="0"/>
+              <a:t>Could pick wrong conference to edit</a:t>
+            </a:r>
+          </a:p>
+          <a:p>
+            <a:pPr>
+              <a:buFont typeface="+mj-lt"/>
+              <a:buAutoNum type="arabicPeriod"/>
+            </a:pPr>
+            <a:r>
+              <a:rPr lang="en-US" sz="2400" dirty="0" smtClean="0"/>
+              <a:t>Input element name could change</a:t>
+            </a:r>
+          </a:p>
+          <a:p>
+            <a:pPr>
+              <a:buFont typeface="+mj-lt"/>
+              <a:buAutoNum type="arabicPeriod"/>
+            </a:pPr>
+            <a:r>
+              <a:rPr lang="en-US" sz="2400" dirty="0" smtClean="0"/>
+              <a:t>Save button text could change</a:t>
+            </a:r>
+          </a:p>
+          <a:p>
+            <a:pPr>
+              <a:buFont typeface="+mj-lt"/>
+              <a:buAutoNum type="arabicPeriod"/>
+            </a:pPr>
+            <a:r>
+              <a:rPr lang="en-US" sz="2400" dirty="0" smtClean="0"/>
+              <a:t>Could have more than one form on page</a:t>
+            </a:r>
+          </a:p>
+          <a:p>
+            <a:pPr>
+              <a:buFont typeface="+mj-lt"/>
+              <a:buAutoNum type="arabicPeriod"/>
+            </a:pPr>
+            <a:r>
+              <a:rPr lang="en-US" sz="2400" dirty="0" smtClean="0"/>
+              <a:t>Landing </a:t>
+            </a:r>
+            <a:r>
+              <a:rPr lang="en-US" sz="2400" dirty="0" err="1" smtClean="0"/>
+              <a:t>url</a:t>
+            </a:r>
+            <a:r>
+              <a:rPr lang="en-US" sz="2400" dirty="0" smtClean="0"/>
+              <a:t> could change</a:t>
+            </a:r>
+          </a:p>
+          <a:p>
+            <a:pPr>
+              <a:buFont typeface="+mj-lt"/>
+              <a:buAutoNum type="arabicPeriod"/>
+            </a:pPr>
+            <a:r>
+              <a:rPr lang="en-US" sz="2400" dirty="0" smtClean="0"/>
+              <a:t>Conference name text could be anywhere</a:t>
+            </a:r>
+            <a:endParaRPr lang="en-US" sz="2400" dirty="0"/>
+          </a:p>
+        </p:txBody>
+      </p:sp>
+      <p:pic>
+        <p:nvPicPr>
+          <p:cNvPr id="5122" name="Picture 2"/>
+          <p:cNvPicPr>
+            <a:picLocks noChangeAspect="1" noChangeArrowheads="1"/>
+          </p:cNvPicPr>
+          <p:nvPr>
+            <p:custDataLst>
+              <p:tags r:id="rId3"/>
+            </p:custDataLst>
+          </p:nvPr>
+        </p:nvPicPr>
+        <p:blipFill>
+          <a:blip r:embed="rId6">
+            <a:extLst>
+              <a:ext uri="{28A0092B-C50C-407E-A947-70E740481C1C}">
+                <a14:useLocalDpi xmlns:a14="http://schemas.microsoft.com/office/drawing/2010/main" val="0"/>
+              </a:ext>
+            </a:extLst>
+          </a:blip>
+          <a:srcRect/>
+          <a:stretch>
+            <a:fillRect/>
+          </a:stretch>
+        </p:blipFill>
+        <p:spPr bwMode="auto">
+          <a:xfrm>
+            <a:off x="4191000" y="1143000"/>
+            <a:ext cx="4822896" cy="3505200"/>
+          </a:xfrm>
+          <a:prstGeom prst="rect">
+            <a:avLst/>
+          </a:prstGeom>
+          <a:noFill/>
+          <a:ln>
+            <a:noFill/>
+          </a:ln>
+          <a:effectLst>
+            <a:glow rad="63500">
+              <a:schemeClr val="accent4">
+                <a:satMod val="175000"/>
+                <a:alpha val="40000"/>
+              </a:schemeClr>
+            </a:glow>
+            <a:outerShdw dist="35921" dir="2700000" algn="ctr" rotWithShape="0">
+              <a:schemeClr val="bg2"/>
+            </a:outerShdw>
+          </a:effectLst>
+          <a:extLst>
+            <a:ext uri="{909E8E84-426E-40DD-AFC4-6F175D3DCCD1}">
+              <a14:hiddenFill xmlns:a14="http://schemas.microsoft.com/office/drawing/2010/main">
+                <a:solidFill>
+                  <a:schemeClr val="accent1"/>
+                </a:solidFill>
+              </a14:hiddenFill>
+            </a:ext>
+            <a:ext uri="{91240B29-F687-4F45-9708-019B960494DF}">
+              <a14:hiddenLine xmlns:a14="http://schemas.microsoft.com/office/drawing/2010/main" w="9525">
+                <a:solidFill>
+                  <a:schemeClr val="tx1"/>
+                </a:solidFill>
+                <a:miter lim="800000"/>
+                <a:headEnd/>
+                <a:tailEnd/>
+              </a14:hiddenLine>
+            </a:ext>
+          </a:extLst>
+        </p:spPr>
+      </p:pic>
+    </p:spTree>
+    <p:custDataLst>
+      <p:tags r:id="rId1"/>
+    </p:custDataLst>
+  </p:cSld>
+  <p:clrMapOvr>
+    <a:masterClrMapping/>
+  </p:clrMapOvr>
+  <p:timing>
+    <p:tnLst>
+      <p:par>
+        <p:cTn id="1" dur="indefinite" restart="never" nodeType="tmRoot"/>
+      </p:par>
+    </p:tnLst>
+  </p:timing>
+</p:sld>
+</file>
+
 <file path=ppt/tags/tag1.xml><?xml version="1.0" encoding="utf-8"?>
 <p:tagLst xmlns:a="http://schemas.openxmlformats.org/drawingml/2006/main" xmlns:r="http://schemas.openxmlformats.org/officeDocument/2006/relationships" xmlns:p="http://schemas.openxmlformats.org/presentationml/2006/main">
   <p:tag name="DVSHAPEID" val="OGLx4gU9giy28aFbxiaOe6"/>
@@ -7491,25 +6873,25 @@
 
 <file path=ppt/tags/tag66.xml><?xml version="1.0" encoding="utf-8"?>
 <p:tagLst xmlns:a="http://schemas.openxmlformats.org/drawingml/2006/main" xmlns:r="http://schemas.openxmlformats.org/officeDocument/2006/relationships" xmlns:p="http://schemas.openxmlformats.org/presentationml/2006/main">
-  <p:tag name="DVSECTIONID" val="v9TOBGUz49ouJ9MyqbAfaO"/>
+  <p:tag name="DVSECTIONID" val="0YQqKwUxoRLcYmCCIQiHOW"/>
 </p:tagLst>
 </file>
 
 <file path=ppt/tags/tag67.xml><?xml version="1.0" encoding="utf-8"?>
 <p:tagLst xmlns:a="http://schemas.openxmlformats.org/drawingml/2006/main" xmlns:r="http://schemas.openxmlformats.org/officeDocument/2006/relationships" xmlns:p="http://schemas.openxmlformats.org/presentationml/2006/main">
-  <p:tag name="DVSHAPEID" val="uA659GxK01l5RE4S2hskxe"/>
+  <p:tag name="DVSHAPEID" val="g5fyV42Pc60frKm8C459fz"/>
 </p:tagLst>
 </file>
 
 <file path=ppt/tags/tag68.xml><?xml version="1.0" encoding="utf-8"?>
 <p:tagLst xmlns:a="http://schemas.openxmlformats.org/drawingml/2006/main" xmlns:r="http://schemas.openxmlformats.org/officeDocument/2006/relationships" xmlns:p="http://schemas.openxmlformats.org/presentationml/2006/main">
-  <p:tag name="DVSECTIONID" val="0YQqKwUxoRLcYmCCIQiHOW"/>
+  <p:tag name="DVSECTIONID" val="yuPzH87sU5NG9UXaVnFwLx"/>
 </p:tagLst>
 </file>
 
 <file path=ppt/tags/tag69.xml><?xml version="1.0" encoding="utf-8"?>
 <p:tagLst xmlns:a="http://schemas.openxmlformats.org/drawingml/2006/main" xmlns:r="http://schemas.openxmlformats.org/officeDocument/2006/relationships" xmlns:p="http://schemas.openxmlformats.org/presentationml/2006/main">
-  <p:tag name="DVSHAPEID" val="g5fyV42Pc60frKm8C459fz"/>
+  <p:tag name="DVSHAPEID" val="4cvGP4KVwvZJ4DLvwAOWzU"/>
 </p:tagLst>
 </file>
 
@@ -7521,61 +6903,61 @@
 
 <file path=ppt/tags/tag70.xml><?xml version="1.0" encoding="utf-8"?>
 <p:tagLst xmlns:a="http://schemas.openxmlformats.org/drawingml/2006/main" xmlns:r="http://schemas.openxmlformats.org/officeDocument/2006/relationships" xmlns:p="http://schemas.openxmlformats.org/presentationml/2006/main">
-  <p:tag name="DVSECTIONID" val="yuPzH87sU5NG9UXaVnFwLx"/>
+  <p:tag name="DVSECTIONID" val="JwbpWNtKWt04qmAbPLqVWF"/>
 </p:tagLst>
 </file>
 
 <file path=ppt/tags/tag71.xml><?xml version="1.0" encoding="utf-8"?>
 <p:tagLst xmlns:a="http://schemas.openxmlformats.org/drawingml/2006/main" xmlns:r="http://schemas.openxmlformats.org/officeDocument/2006/relationships" xmlns:p="http://schemas.openxmlformats.org/presentationml/2006/main">
-  <p:tag name="DVSHAPEID" val="4cvGP4KVwvZJ4DLvwAOWzU"/>
+  <p:tag name="DVSHAPEID" val="ETXiBoUJW69H133ffY4hzu"/>
 </p:tagLst>
 </file>
 
 <file path=ppt/tags/tag72.xml><?xml version="1.0" encoding="utf-8"?>
 <p:tagLst xmlns:a="http://schemas.openxmlformats.org/drawingml/2006/main" xmlns:r="http://schemas.openxmlformats.org/officeDocument/2006/relationships" xmlns:p="http://schemas.openxmlformats.org/presentationml/2006/main">
-  <p:tag name="DVSECTIONID" val="JwbpWNtKWt04qmAbPLqVWF"/>
+  <p:tag name="DVSECTIONID" val="ohdHExUU1ia1KiohcjZa8k"/>
 </p:tagLst>
 </file>
 
 <file path=ppt/tags/tag73.xml><?xml version="1.0" encoding="utf-8"?>
 <p:tagLst xmlns:a="http://schemas.openxmlformats.org/drawingml/2006/main" xmlns:r="http://schemas.openxmlformats.org/officeDocument/2006/relationships" xmlns:p="http://schemas.openxmlformats.org/presentationml/2006/main">
-  <p:tag name="DVSHAPEID" val="ETXiBoUJW69H133ffY4hzu"/>
+  <p:tag name="DVSHAPEID" val="gHFIm6yvkjZayCIwtl1MzT"/>
 </p:tagLst>
 </file>
 
 <file path=ppt/tags/tag74.xml><?xml version="1.0" encoding="utf-8"?>
 <p:tagLst xmlns:a="http://schemas.openxmlformats.org/drawingml/2006/main" xmlns:r="http://schemas.openxmlformats.org/officeDocument/2006/relationships" xmlns:p="http://schemas.openxmlformats.org/presentationml/2006/main">
-  <p:tag name="DVSECTIONID" val="ohdHExUU1ia1KiohcjZa8k"/>
+  <p:tag name="DVSECTIONID" val="G4tBAKyU5PA38Tce8VP2rH"/>
 </p:tagLst>
 </file>
 
 <file path=ppt/tags/tag75.xml><?xml version="1.0" encoding="utf-8"?>
 <p:tagLst xmlns:a="http://schemas.openxmlformats.org/drawingml/2006/main" xmlns:r="http://schemas.openxmlformats.org/officeDocument/2006/relationships" xmlns:p="http://schemas.openxmlformats.org/presentationml/2006/main">
-  <p:tag name="DVSHAPEID" val="gHFIm6yvkjZayCIwtl1MzT"/>
+  <p:tag name="DVSHAPEID" val="AnCIshkQRik9DgCS2NbqMP"/>
 </p:tagLst>
 </file>
 
 <file path=ppt/tags/tag76.xml><?xml version="1.0" encoding="utf-8"?>
 <p:tagLst xmlns:a="http://schemas.openxmlformats.org/drawingml/2006/main" xmlns:r="http://schemas.openxmlformats.org/officeDocument/2006/relationships" xmlns:p="http://schemas.openxmlformats.org/presentationml/2006/main">
-  <p:tag name="DVSECTIONID" val="G4tBAKyU5PA38Tce8VP2rH"/>
+  <p:tag name="DVSECTIONID" val="UpBiMxy7WMx4B8d3Xam7dk"/>
 </p:tagLst>
 </file>
 
 <file path=ppt/tags/tag77.xml><?xml version="1.0" encoding="utf-8"?>
 <p:tagLst xmlns:a="http://schemas.openxmlformats.org/drawingml/2006/main" xmlns:r="http://schemas.openxmlformats.org/officeDocument/2006/relationships" xmlns:p="http://schemas.openxmlformats.org/presentationml/2006/main">
-  <p:tag name="DVSHAPEID" val="AnCIshkQRik9DgCS2NbqMP"/>
+  <p:tag name="DVSHAPEID" val="IQurwIuIfMVn6i6EEhatrG"/>
 </p:tagLst>
 </file>
 
 <file path=ppt/tags/tag78.xml><?xml version="1.0" encoding="utf-8"?>
 <p:tagLst xmlns:a="http://schemas.openxmlformats.org/drawingml/2006/main" xmlns:r="http://schemas.openxmlformats.org/officeDocument/2006/relationships" xmlns:p="http://schemas.openxmlformats.org/presentationml/2006/main">
-  <p:tag name="DVSECTIONID" val="UpBiMxy7WMx4B8d3Xam7dk"/>
+  <p:tag name="DVSHAPEID" val="PpYsUBjdB97LELd1KCm92x"/>
 </p:tagLst>
 </file>
 
 <file path=ppt/tags/tag79.xml><?xml version="1.0" encoding="utf-8"?>
 <p:tagLst xmlns:a="http://schemas.openxmlformats.org/drawingml/2006/main" xmlns:r="http://schemas.openxmlformats.org/officeDocument/2006/relationships" xmlns:p="http://schemas.openxmlformats.org/presentationml/2006/main">
-  <p:tag name="DVSHAPEID" val="IQurwIuIfMVn6i6EEhatrG"/>
+  <p:tag name="DVSHAPEID" val="eg9kLo8Tfin105s3NTp2bM"/>
 </p:tagLst>
 </file>
 
@@ -7587,59 +6969,47 @@
 
 <file path=ppt/tags/tag80.xml><?xml version="1.0" encoding="utf-8"?>
 <p:tagLst xmlns:a="http://schemas.openxmlformats.org/drawingml/2006/main" xmlns:r="http://schemas.openxmlformats.org/officeDocument/2006/relationships" xmlns:p="http://schemas.openxmlformats.org/presentationml/2006/main">
-  <p:tag name="DVSHAPEID" val="PpYsUBjdB97LELd1KCm92x"/>
+  <p:tag name="DVSHAPEID" val="glDkqDwy7iDiaIjzPV5ITO"/>
 </p:tagLst>
 </file>
 
 <file path=ppt/tags/tag81.xml><?xml version="1.0" encoding="utf-8"?>
 <p:tagLst xmlns:a="http://schemas.openxmlformats.org/drawingml/2006/main" xmlns:r="http://schemas.openxmlformats.org/officeDocument/2006/relationships" xmlns:p="http://schemas.openxmlformats.org/presentationml/2006/main">
-  <p:tag name="DVSHAPEID" val="eg9kLo8Tfin105s3NTp2bM"/>
+  <p:tag name="DVSECTIONID" val="qHav4Xa4k6SY94ZhX0lXTN"/>
 </p:tagLst>
 </file>
 
 <file path=ppt/tags/tag82.xml><?xml version="1.0" encoding="utf-8"?>
 <p:tagLst xmlns:a="http://schemas.openxmlformats.org/drawingml/2006/main" xmlns:r="http://schemas.openxmlformats.org/officeDocument/2006/relationships" xmlns:p="http://schemas.openxmlformats.org/presentationml/2006/main">
-  <p:tag name="DVSHAPEID" val="glDkqDwy7iDiaIjzPV5ITO"/>
+  <p:tag name="DVSHAPEID" val="nDL8yGOsJ0ms0NHqXunHb5"/>
 </p:tagLst>
 </file>
 
 <file path=ppt/tags/tag83.xml><?xml version="1.0" encoding="utf-8"?>
 <p:tagLst xmlns:a="http://schemas.openxmlformats.org/drawingml/2006/main" xmlns:r="http://schemas.openxmlformats.org/officeDocument/2006/relationships" xmlns:p="http://schemas.openxmlformats.org/presentationml/2006/main">
-  <p:tag name="DVSECTIONID" val="qHav4Xa4k6SY94ZhX0lXTN"/>
+  <p:tag name="DVSECTIONID" val="w3h315XFFkuzYU8htBWSsq"/>
 </p:tagLst>
 </file>
 
 <file path=ppt/tags/tag84.xml><?xml version="1.0" encoding="utf-8"?>
 <p:tagLst xmlns:a="http://schemas.openxmlformats.org/drawingml/2006/main" xmlns:r="http://schemas.openxmlformats.org/officeDocument/2006/relationships" xmlns:p="http://schemas.openxmlformats.org/presentationml/2006/main">
-  <p:tag name="DVSHAPEID" val="nDL8yGOsJ0ms0NHqXunHb5"/>
+  <p:tag name="DVSHAPEID" val="oIUJKe3tWtSrY0zh5QJEyC"/>
 </p:tagLst>
 </file>
 
 <file path=ppt/tags/tag85.xml><?xml version="1.0" encoding="utf-8"?>
 <p:tagLst xmlns:a="http://schemas.openxmlformats.org/drawingml/2006/main" xmlns:r="http://schemas.openxmlformats.org/officeDocument/2006/relationships" xmlns:p="http://schemas.openxmlformats.org/presentationml/2006/main">
-  <p:tag name="DVSECTIONID" val="w3h315XFFkuzYU8htBWSsq"/>
+  <p:tag name="DVSHAPEID" val="VIIvSoXAkcDhe2dOVAog4T"/>
 </p:tagLst>
 </file>
 
 <file path=ppt/tags/tag86.xml><?xml version="1.0" encoding="utf-8"?>
 <p:tagLst xmlns:a="http://schemas.openxmlformats.org/drawingml/2006/main" xmlns:r="http://schemas.openxmlformats.org/officeDocument/2006/relationships" xmlns:p="http://schemas.openxmlformats.org/presentationml/2006/main">
-  <p:tag name="DVSHAPEID" val="oIUJKe3tWtSrY0zh5QJEyC"/>
+  <p:tag name="DVSECTIONID" val="cDY93GclMfqCb6d0W56Fqy"/>
 </p:tagLst>
 </file>
 
 <file path=ppt/tags/tag87.xml><?xml version="1.0" encoding="utf-8"?>
-<p:tagLst xmlns:a="http://schemas.openxmlformats.org/drawingml/2006/main" xmlns:r="http://schemas.openxmlformats.org/officeDocument/2006/relationships" xmlns:p="http://schemas.openxmlformats.org/presentationml/2006/main">
-  <p:tag name="DVSHAPEID" val="VIIvSoXAkcDhe2dOVAog4T"/>
-</p:tagLst>
-</file>
-
-<file path=ppt/tags/tag88.xml><?xml version="1.0" encoding="utf-8"?>
-<p:tagLst xmlns:a="http://schemas.openxmlformats.org/drawingml/2006/main" xmlns:r="http://schemas.openxmlformats.org/officeDocument/2006/relationships" xmlns:p="http://schemas.openxmlformats.org/presentationml/2006/main">
-  <p:tag name="DVSECTIONID" val="cDY93GclMfqCb6d0W56Fqy"/>
-</p:tagLst>
-</file>
-
-<file path=ppt/tags/tag89.xml><?xml version="1.0" encoding="utf-8"?>
 <p:tagLst xmlns:a="http://schemas.openxmlformats.org/drawingml/2006/main" xmlns:r="http://schemas.openxmlformats.org/officeDocument/2006/relationships" xmlns:p="http://schemas.openxmlformats.org/presentationml/2006/main">
   <p:tag name="DVSHAPEID" val="zyPGRFpwXwwLMc1flFvm8G"/>
 </p:tagLst>

</xml_diff>